<commit_message>
posterior predictive checks done
</commit_message>
<xml_diff>
--- a/mid term presentation.pptx
+++ b/mid term presentation.pptx
@@ -5,7 +5,7 @@
     <p:sldMasterId id="2147483673" r:id="rId1"/>
   </p:sldMasterIdLst>
   <p:notesMasterIdLst>
-    <p:notesMasterId r:id="rId25"/>
+    <p:notesMasterId r:id="rId26"/>
   </p:notesMasterIdLst>
   <p:sldIdLst>
     <p:sldId id="271" r:id="rId2"/>
@@ -26,11 +26,12 @@
     <p:sldId id="296" r:id="rId17"/>
     <p:sldId id="297" r:id="rId18"/>
     <p:sldId id="288" r:id="rId19"/>
-    <p:sldId id="292" r:id="rId20"/>
-    <p:sldId id="273" r:id="rId21"/>
-    <p:sldId id="291" r:id="rId22"/>
-    <p:sldId id="274" r:id="rId23"/>
-    <p:sldId id="279" r:id="rId24"/>
+    <p:sldId id="298" r:id="rId20"/>
+    <p:sldId id="292" r:id="rId21"/>
+    <p:sldId id="273" r:id="rId22"/>
+    <p:sldId id="291" r:id="rId23"/>
+    <p:sldId id="274" r:id="rId24"/>
+    <p:sldId id="279" r:id="rId25"/>
   </p:sldIdLst>
   <p:sldSz cx="12192000" cy="6858000"/>
   <p:notesSz cx="6858000" cy="9144000"/>
@@ -4435,6 +4436,13 @@
         </dgm:presLayoutVars>
       </dgm:prSet>
       <dgm:spPr/>
+      <dgm:t>
+        <a:bodyPr/>
+        <a:lstStyle/>
+        <a:p>
+          <a:endParaRPr lang="en-IN"/>
+        </a:p>
+      </dgm:t>
     </dgm:pt>
     <dgm:pt modelId="{4360558E-1B8F-42CD-9536-FA42452A5B9B}" type="pres">
       <dgm:prSet presAssocID="{F7CCF8BE-C5C6-480C-941F-BC51210439A6}" presName="parentLin" presStyleCnt="0"/>
@@ -4443,6 +4451,13 @@
     <dgm:pt modelId="{D2687CAC-8E36-4BAD-9805-FCA2FD3ECE51}" type="pres">
       <dgm:prSet presAssocID="{F7CCF8BE-C5C6-480C-941F-BC51210439A6}" presName="parentLeftMargin" presStyleLbl="node1" presStyleIdx="0" presStyleCnt="4"/>
       <dgm:spPr/>
+      <dgm:t>
+        <a:bodyPr/>
+        <a:lstStyle/>
+        <a:p>
+          <a:endParaRPr lang="en-IN"/>
+        </a:p>
+      </dgm:t>
     </dgm:pt>
     <dgm:pt modelId="{08B9ECD3-4292-44A0-A85B-B39FA3A13DC1}" type="pres">
       <dgm:prSet presAssocID="{F7CCF8BE-C5C6-480C-941F-BC51210439A6}" presName="parentText" presStyleLbl="node1" presStyleIdx="0" presStyleCnt="4">
@@ -4483,6 +4498,13 @@
     <dgm:pt modelId="{65A58C6A-D911-4915-AB4C-F5ACA426AFA6}" type="pres">
       <dgm:prSet presAssocID="{43D293A7-95E4-4AAE-8471-DB36821093D5}" presName="parentLeftMargin" presStyleLbl="node1" presStyleIdx="0" presStyleCnt="4"/>
       <dgm:spPr/>
+      <dgm:t>
+        <a:bodyPr/>
+        <a:lstStyle/>
+        <a:p>
+          <a:endParaRPr lang="en-IN"/>
+        </a:p>
+      </dgm:t>
     </dgm:pt>
     <dgm:pt modelId="{020BF3BE-0C0F-4990-A4AF-33945C7D902D}" type="pres">
       <dgm:prSet presAssocID="{43D293A7-95E4-4AAE-8471-DB36821093D5}" presName="parentText" presStyleLbl="node1" presStyleIdx="1" presStyleCnt="4">
@@ -4523,6 +4545,13 @@
     <dgm:pt modelId="{23C1F804-1563-4A5B-B323-A3092D211405}" type="pres">
       <dgm:prSet presAssocID="{97BD3130-5128-45D8-951A-0A2CAD70BEFC}" presName="parentLeftMargin" presStyleLbl="node1" presStyleIdx="1" presStyleCnt="4"/>
       <dgm:spPr/>
+      <dgm:t>
+        <a:bodyPr/>
+        <a:lstStyle/>
+        <a:p>
+          <a:endParaRPr lang="en-IN"/>
+        </a:p>
+      </dgm:t>
     </dgm:pt>
     <dgm:pt modelId="{31119444-DBF7-4401-9EE7-9AC62541184F}" type="pres">
       <dgm:prSet presAssocID="{97BD3130-5128-45D8-951A-0A2CAD70BEFC}" presName="parentText" presStyleLbl="node1" presStyleIdx="2" presStyleCnt="4">
@@ -4563,6 +4592,13 @@
     <dgm:pt modelId="{6F927957-66E8-4AC3-A377-8139F1EF6196}" type="pres">
       <dgm:prSet presAssocID="{BCBCE5F7-11BF-4CB5-B998-82283E498044}" presName="parentLeftMargin" presStyleLbl="node1" presStyleIdx="2" presStyleCnt="4"/>
       <dgm:spPr/>
+      <dgm:t>
+        <a:bodyPr/>
+        <a:lstStyle/>
+        <a:p>
+          <a:endParaRPr lang="en-IN"/>
+        </a:p>
+      </dgm:t>
     </dgm:pt>
     <dgm:pt modelId="{4CA68685-41EA-423D-8D51-7D146AA6D434}" type="pres">
       <dgm:prSet presAssocID="{BCBCE5F7-11BF-4CB5-B998-82283E498044}" presName="parentText" presStyleLbl="node1" presStyleIdx="3" presStyleCnt="4">
@@ -4597,13 +4633,13 @@
     <dgm:cxn modelId="{A58CDE8A-6FA1-462D-9F50-E3A315634B7C}" type="presOf" srcId="{19FFB2C3-AE84-4B29-8D88-9BF437BA173E}" destId="{48A2258D-150D-4459-ACA6-18E0E13E41B6}" srcOrd="0" destOrd="0" presId="urn:microsoft.com/office/officeart/2005/8/layout/list1"/>
     <dgm:cxn modelId="{104AD764-C7D4-4332-9CDB-9BA15D392158}" type="presOf" srcId="{97BD3130-5128-45D8-951A-0A2CAD70BEFC}" destId="{23C1F804-1563-4A5B-B323-A3092D211405}" srcOrd="0" destOrd="0" presId="urn:microsoft.com/office/officeart/2005/8/layout/list1"/>
     <dgm:cxn modelId="{8698ADDD-5230-45BF-9FE5-732D53D84CD1}" type="presOf" srcId="{BCBCE5F7-11BF-4CB5-B998-82283E498044}" destId="{6F927957-66E8-4AC3-A377-8139F1EF6196}" srcOrd="0" destOrd="0" presId="urn:microsoft.com/office/officeart/2005/8/layout/list1"/>
-    <dgm:cxn modelId="{332827FE-B3DC-4214-BD86-D8719A2547A0}" type="presOf" srcId="{43D293A7-95E4-4AAE-8471-DB36821093D5}" destId="{65A58C6A-D911-4915-AB4C-F5ACA426AFA6}" srcOrd="0" destOrd="0" presId="urn:microsoft.com/office/officeart/2005/8/layout/list1"/>
     <dgm:cxn modelId="{0BEE0264-4FE3-4295-B806-5A2AD31D0BCE}" type="presOf" srcId="{97BD3130-5128-45D8-951A-0A2CAD70BEFC}" destId="{31119444-DBF7-4401-9EE7-9AC62541184F}" srcOrd="1" destOrd="0" presId="urn:microsoft.com/office/officeart/2005/8/layout/list1"/>
     <dgm:cxn modelId="{984E6023-430A-4332-8E4B-A21D01869BC7}" srcId="{19FFB2C3-AE84-4B29-8D88-9BF437BA173E}" destId="{BCBCE5F7-11BF-4CB5-B998-82283E498044}" srcOrd="3" destOrd="0" parTransId="{1DEE8EA6-F707-4BB2-80FE-6A83A88DD0F9}" sibTransId="{49B62931-E3F3-4DB4-B80C-9F7929A57687}"/>
+    <dgm:cxn modelId="{332827FE-B3DC-4214-BD86-D8719A2547A0}" type="presOf" srcId="{43D293A7-95E4-4AAE-8471-DB36821093D5}" destId="{65A58C6A-D911-4915-AB4C-F5ACA426AFA6}" srcOrd="0" destOrd="0" presId="urn:microsoft.com/office/officeart/2005/8/layout/list1"/>
     <dgm:cxn modelId="{C22FE31B-9AAD-4A53-BB20-218920BD99B6}" type="presOf" srcId="{F7CCF8BE-C5C6-480C-941F-BC51210439A6}" destId="{08B9ECD3-4292-44A0-A85B-B39FA3A13DC1}" srcOrd="1" destOrd="0" presId="urn:microsoft.com/office/officeart/2005/8/layout/list1"/>
     <dgm:cxn modelId="{A0094D51-9B65-4C61-B9EF-3C7D69E37BB8}" srcId="{19FFB2C3-AE84-4B29-8D88-9BF437BA173E}" destId="{97BD3130-5128-45D8-951A-0A2CAD70BEFC}" srcOrd="2" destOrd="0" parTransId="{3985D8B1-B994-4692-B383-6B09D8790FC2}" sibTransId="{C729E4A4-7C6E-4E8B-B3F1-9203A37BE6A5}"/>
+    <dgm:cxn modelId="{480DDA25-F6B1-4607-92B7-3B4D2DC1EAB3}" type="presOf" srcId="{F7CCF8BE-C5C6-480C-941F-BC51210439A6}" destId="{D2687CAC-8E36-4BAD-9805-FCA2FD3ECE51}" srcOrd="0" destOrd="0" presId="urn:microsoft.com/office/officeart/2005/8/layout/list1"/>
     <dgm:cxn modelId="{0AD31D5B-AB16-4844-A096-A8E9620C0148}" srcId="{19FFB2C3-AE84-4B29-8D88-9BF437BA173E}" destId="{43D293A7-95E4-4AAE-8471-DB36821093D5}" srcOrd="1" destOrd="0" parTransId="{24D43FB9-1638-4AD8-8CBF-C918EAC8E231}" sibTransId="{4DA495AF-39E3-41D4-ACA7-2C5B284836E9}"/>
-    <dgm:cxn modelId="{480DDA25-F6B1-4607-92B7-3B4D2DC1EAB3}" type="presOf" srcId="{F7CCF8BE-C5C6-480C-941F-BC51210439A6}" destId="{D2687CAC-8E36-4BAD-9805-FCA2FD3ECE51}" srcOrd="0" destOrd="0" presId="urn:microsoft.com/office/officeart/2005/8/layout/list1"/>
     <dgm:cxn modelId="{33C3694C-E1F5-45AA-A8CA-A94E5D7B26D2}" type="presOf" srcId="{BCBCE5F7-11BF-4CB5-B998-82283E498044}" destId="{4CA68685-41EA-423D-8D51-7D146AA6D434}" srcOrd="1" destOrd="0" presId="urn:microsoft.com/office/officeart/2005/8/layout/list1"/>
     <dgm:cxn modelId="{B26D6D46-E2C8-41AA-BA24-343A63FD9CD5}" srcId="{19FFB2C3-AE84-4B29-8D88-9BF437BA173E}" destId="{F7CCF8BE-C5C6-480C-941F-BC51210439A6}" srcOrd="0" destOrd="0" parTransId="{EE8AC459-4E2C-493D-AE06-E37065324B2C}" sibTransId="{DCA37244-2F31-4AA1-AD01-989F02B6FC2B}"/>
     <dgm:cxn modelId="{C99603E1-B0C9-409F-86B8-117975EC5D48}" type="presOf" srcId="{43D293A7-95E4-4AAE-8471-DB36821093D5}" destId="{020BF3BE-0C0F-4990-A4AF-33945C7D902D}" srcOrd="1" destOrd="0" presId="urn:microsoft.com/office/officeart/2005/8/layout/list1"/>
@@ -5298,506 +5334,6 @@
       <dsp:cNvGrpSpPr/>
     </dsp:nvGrpSpPr>
     <dsp:grpSpPr/>
-    <dsp:sp modelId="{24653161-CF7B-4828-9373-2E24672E7D0F}">
-      <dsp:nvSpPr>
-        <dsp:cNvPr id="0" name=""/>
-        <dsp:cNvSpPr/>
-      </dsp:nvSpPr>
-      <dsp:spPr>
-        <a:xfrm>
-          <a:off x="0" y="692682"/>
-          <a:ext cx="10058399" cy="453600"/>
-        </a:xfrm>
-        <a:prstGeom prst="rect">
-          <a:avLst/>
-        </a:prstGeom>
-        <a:solidFill>
-          <a:schemeClr val="lt1">
-            <a:alpha val="90000"/>
-            <a:hueOff val="0"/>
-            <a:satOff val="0"/>
-            <a:lumOff val="0"/>
-            <a:alphaOff val="0"/>
-          </a:schemeClr>
-        </a:solidFill>
-        <a:ln w="15875" cap="flat" cmpd="sng" algn="ctr">
-          <a:solidFill>
-            <a:schemeClr val="accent1">
-              <a:hueOff val="0"/>
-              <a:satOff val="0"/>
-              <a:lumOff val="0"/>
-              <a:alphaOff val="0"/>
-            </a:schemeClr>
-          </a:solidFill>
-          <a:prstDash val="solid"/>
-        </a:ln>
-        <a:effectLst/>
-      </dsp:spPr>
-      <dsp:style>
-        <a:lnRef idx="2">
-          <a:scrgbClr r="0" g="0" b="0"/>
-        </a:lnRef>
-        <a:fillRef idx="1">
-          <a:scrgbClr r="0" g="0" b="0"/>
-        </a:fillRef>
-        <a:effectRef idx="0">
-          <a:scrgbClr r="0" g="0" b="0"/>
-        </a:effectRef>
-        <a:fontRef idx="minor"/>
-      </dsp:style>
-    </dsp:sp>
-    <dsp:sp modelId="{08B9ECD3-4292-44A0-A85B-B39FA3A13DC1}">
-      <dsp:nvSpPr>
-        <dsp:cNvPr id="0" name=""/>
-        <dsp:cNvSpPr/>
-      </dsp:nvSpPr>
-      <dsp:spPr>
-        <a:xfrm>
-          <a:off x="502920" y="427002"/>
-          <a:ext cx="7040880" cy="531360"/>
-        </a:xfrm>
-        <a:prstGeom prst="roundRect">
-          <a:avLst/>
-        </a:prstGeom>
-        <a:solidFill>
-          <a:schemeClr val="accent1">
-            <a:hueOff val="0"/>
-            <a:satOff val="0"/>
-            <a:lumOff val="0"/>
-            <a:alphaOff val="0"/>
-          </a:schemeClr>
-        </a:solidFill>
-        <a:ln w="15875" cap="flat" cmpd="sng" algn="ctr">
-          <a:solidFill>
-            <a:schemeClr val="lt1">
-              <a:hueOff val="0"/>
-              <a:satOff val="0"/>
-              <a:lumOff val="0"/>
-              <a:alphaOff val="0"/>
-            </a:schemeClr>
-          </a:solidFill>
-          <a:prstDash val="solid"/>
-        </a:ln>
-        <a:effectLst/>
-      </dsp:spPr>
-      <dsp:style>
-        <a:lnRef idx="2">
-          <a:scrgbClr r="0" g="0" b="0"/>
-        </a:lnRef>
-        <a:fillRef idx="1">
-          <a:scrgbClr r="0" g="0" b="0"/>
-        </a:fillRef>
-        <a:effectRef idx="0">
-          <a:scrgbClr r="0" g="0" b="0"/>
-        </a:effectRef>
-        <a:fontRef idx="minor">
-          <a:schemeClr val="lt1"/>
-        </a:fontRef>
-      </dsp:style>
-      <dsp:txBody>
-        <a:bodyPr spcFirstLastPara="0" vert="horz" wrap="square" lIns="266129" tIns="0" rIns="266129" bIns="0" numCol="1" spcCol="1270" anchor="ctr" anchorCtr="0">
-          <a:noAutofit/>
-        </a:bodyPr>
-        <a:lstStyle/>
-        <a:p>
-          <a:pPr lvl="0" algn="l" defTabSz="800100">
-            <a:lnSpc>
-              <a:spcPct val="90000"/>
-            </a:lnSpc>
-            <a:spcBef>
-              <a:spcPct val="0"/>
-            </a:spcBef>
-            <a:spcAft>
-              <a:spcPct val="35000"/>
-            </a:spcAft>
-          </a:pPr>
-          <a:r>
-            <a:rPr lang="en-IN" sz="1800" kern="1200" dirty="0" smtClean="0"/>
-            <a:t>HW test passed</a:t>
-          </a:r>
-          <a:endParaRPr lang="en-IN" sz="1800" kern="1200" dirty="0"/>
-        </a:p>
-      </dsp:txBody>
-      <dsp:txXfrm>
-        <a:off x="528859" y="452941"/>
-        <a:ext cx="6989002" cy="479482"/>
-      </dsp:txXfrm>
-    </dsp:sp>
-    <dsp:sp modelId="{03F82894-C00F-4296-A79D-2DDEDDD789A0}">
-      <dsp:nvSpPr>
-        <dsp:cNvPr id="0" name=""/>
-        <dsp:cNvSpPr/>
-      </dsp:nvSpPr>
-      <dsp:spPr>
-        <a:xfrm>
-          <a:off x="0" y="1509162"/>
-          <a:ext cx="10058399" cy="453600"/>
-        </a:xfrm>
-        <a:prstGeom prst="rect">
-          <a:avLst/>
-        </a:prstGeom>
-        <a:solidFill>
-          <a:schemeClr val="lt1">
-            <a:alpha val="90000"/>
-            <a:hueOff val="0"/>
-            <a:satOff val="0"/>
-            <a:lumOff val="0"/>
-            <a:alphaOff val="0"/>
-          </a:schemeClr>
-        </a:solidFill>
-        <a:ln w="15875" cap="flat" cmpd="sng" algn="ctr">
-          <a:solidFill>
-            <a:schemeClr val="accent1">
-              <a:hueOff val="0"/>
-              <a:satOff val="0"/>
-              <a:lumOff val="0"/>
-              <a:alphaOff val="0"/>
-            </a:schemeClr>
-          </a:solidFill>
-          <a:prstDash val="solid"/>
-        </a:ln>
-        <a:effectLst/>
-      </dsp:spPr>
-      <dsp:style>
-        <a:lnRef idx="2">
-          <a:scrgbClr r="0" g="0" b="0"/>
-        </a:lnRef>
-        <a:fillRef idx="1">
-          <a:scrgbClr r="0" g="0" b="0"/>
-        </a:fillRef>
-        <a:effectRef idx="0">
-          <a:scrgbClr r="0" g="0" b="0"/>
-        </a:effectRef>
-        <a:fontRef idx="minor"/>
-      </dsp:style>
-    </dsp:sp>
-    <dsp:sp modelId="{020BF3BE-0C0F-4990-A4AF-33945C7D902D}">
-      <dsp:nvSpPr>
-        <dsp:cNvPr id="0" name=""/>
-        <dsp:cNvSpPr/>
-      </dsp:nvSpPr>
-      <dsp:spPr>
-        <a:xfrm>
-          <a:off x="502920" y="1243482"/>
-          <a:ext cx="7040880" cy="531360"/>
-        </a:xfrm>
-        <a:prstGeom prst="roundRect">
-          <a:avLst/>
-        </a:prstGeom>
-        <a:solidFill>
-          <a:schemeClr val="accent1">
-            <a:hueOff val="0"/>
-            <a:satOff val="0"/>
-            <a:lumOff val="0"/>
-            <a:alphaOff val="0"/>
-          </a:schemeClr>
-        </a:solidFill>
-        <a:ln w="15875" cap="flat" cmpd="sng" algn="ctr">
-          <a:solidFill>
-            <a:schemeClr val="lt1">
-              <a:hueOff val="0"/>
-              <a:satOff val="0"/>
-              <a:lumOff val="0"/>
-              <a:alphaOff val="0"/>
-            </a:schemeClr>
-          </a:solidFill>
-          <a:prstDash val="solid"/>
-        </a:ln>
-        <a:effectLst/>
-      </dsp:spPr>
-      <dsp:style>
-        <a:lnRef idx="2">
-          <a:scrgbClr r="0" g="0" b="0"/>
-        </a:lnRef>
-        <a:fillRef idx="1">
-          <a:scrgbClr r="0" g="0" b="0"/>
-        </a:fillRef>
-        <a:effectRef idx="0">
-          <a:scrgbClr r="0" g="0" b="0"/>
-        </a:effectRef>
-        <a:fontRef idx="minor">
-          <a:schemeClr val="lt1"/>
-        </a:fontRef>
-      </dsp:style>
-      <dsp:txBody>
-        <a:bodyPr spcFirstLastPara="0" vert="horz" wrap="square" lIns="266129" tIns="0" rIns="266129" bIns="0" numCol="1" spcCol="1270" anchor="ctr" anchorCtr="0">
-          <a:noAutofit/>
-        </a:bodyPr>
-        <a:lstStyle/>
-        <a:p>
-          <a:pPr lvl="0" algn="l" defTabSz="800100">
-            <a:lnSpc>
-              <a:spcPct val="90000"/>
-            </a:lnSpc>
-            <a:spcBef>
-              <a:spcPct val="0"/>
-            </a:spcBef>
-            <a:spcAft>
-              <a:spcPct val="35000"/>
-            </a:spcAft>
-          </a:pPr>
-          <a:r>
-            <a:rPr lang="en-IN" sz="1800" kern="1200" dirty="0" smtClean="0"/>
-            <a:t>DIC 4 works best when components are well separated </a:t>
-          </a:r>
-          <a:endParaRPr lang="en-IN" sz="1800" kern="1200" dirty="0"/>
-        </a:p>
-      </dsp:txBody>
-      <dsp:txXfrm>
-        <a:off x="528859" y="1269421"/>
-        <a:ext cx="6989002" cy="479482"/>
-      </dsp:txXfrm>
-    </dsp:sp>
-    <dsp:sp modelId="{56C4644B-55C4-4738-962D-8486393AD584}">
-      <dsp:nvSpPr>
-        <dsp:cNvPr id="0" name=""/>
-        <dsp:cNvSpPr/>
-      </dsp:nvSpPr>
-      <dsp:spPr>
-        <a:xfrm>
-          <a:off x="0" y="2325642"/>
-          <a:ext cx="10058399" cy="453600"/>
-        </a:xfrm>
-        <a:prstGeom prst="rect">
-          <a:avLst/>
-        </a:prstGeom>
-        <a:solidFill>
-          <a:schemeClr val="lt1">
-            <a:alpha val="90000"/>
-            <a:hueOff val="0"/>
-            <a:satOff val="0"/>
-            <a:lumOff val="0"/>
-            <a:alphaOff val="0"/>
-          </a:schemeClr>
-        </a:solidFill>
-        <a:ln w="15875" cap="flat" cmpd="sng" algn="ctr">
-          <a:solidFill>
-            <a:schemeClr val="accent1">
-              <a:hueOff val="0"/>
-              <a:satOff val="0"/>
-              <a:lumOff val="0"/>
-              <a:alphaOff val="0"/>
-            </a:schemeClr>
-          </a:solidFill>
-          <a:prstDash val="solid"/>
-        </a:ln>
-        <a:effectLst/>
-      </dsp:spPr>
-      <dsp:style>
-        <a:lnRef idx="2">
-          <a:scrgbClr r="0" g="0" b="0"/>
-        </a:lnRef>
-        <a:fillRef idx="1">
-          <a:scrgbClr r="0" g="0" b="0"/>
-        </a:fillRef>
-        <a:effectRef idx="0">
-          <a:scrgbClr r="0" g="0" b="0"/>
-        </a:effectRef>
-        <a:fontRef idx="minor"/>
-      </dsp:style>
-    </dsp:sp>
-    <dsp:sp modelId="{31119444-DBF7-4401-9EE7-9AC62541184F}">
-      <dsp:nvSpPr>
-        <dsp:cNvPr id="0" name=""/>
-        <dsp:cNvSpPr/>
-      </dsp:nvSpPr>
-      <dsp:spPr>
-        <a:xfrm>
-          <a:off x="502920" y="2059962"/>
-          <a:ext cx="7040880" cy="531360"/>
-        </a:xfrm>
-        <a:prstGeom prst="roundRect">
-          <a:avLst/>
-        </a:prstGeom>
-        <a:solidFill>
-          <a:schemeClr val="accent1">
-            <a:hueOff val="0"/>
-            <a:satOff val="0"/>
-            <a:lumOff val="0"/>
-            <a:alphaOff val="0"/>
-          </a:schemeClr>
-        </a:solidFill>
-        <a:ln w="15875" cap="flat" cmpd="sng" algn="ctr">
-          <a:solidFill>
-            <a:schemeClr val="lt1">
-              <a:hueOff val="0"/>
-              <a:satOff val="0"/>
-              <a:lumOff val="0"/>
-              <a:alphaOff val="0"/>
-            </a:schemeClr>
-          </a:solidFill>
-          <a:prstDash val="solid"/>
-        </a:ln>
-        <a:effectLst/>
-      </dsp:spPr>
-      <dsp:style>
-        <a:lnRef idx="2">
-          <a:scrgbClr r="0" g="0" b="0"/>
-        </a:lnRef>
-        <a:fillRef idx="1">
-          <a:scrgbClr r="0" g="0" b="0"/>
-        </a:fillRef>
-        <a:effectRef idx="0">
-          <a:scrgbClr r="0" g="0" b="0"/>
-        </a:effectRef>
-        <a:fontRef idx="minor">
-          <a:schemeClr val="lt1"/>
-        </a:fontRef>
-      </dsp:style>
-      <dsp:txBody>
-        <a:bodyPr spcFirstLastPara="0" vert="horz" wrap="square" lIns="266129" tIns="0" rIns="266129" bIns="0" numCol="1" spcCol="1270" anchor="ctr" anchorCtr="0">
-          <a:noAutofit/>
-        </a:bodyPr>
-        <a:lstStyle/>
-        <a:p>
-          <a:pPr lvl="0" algn="l" defTabSz="800100">
-            <a:lnSpc>
-              <a:spcPct val="90000"/>
-            </a:lnSpc>
-            <a:spcBef>
-              <a:spcPct val="0"/>
-            </a:spcBef>
-            <a:spcAft>
-              <a:spcPct val="35000"/>
-            </a:spcAft>
-          </a:pPr>
-          <a:r>
-            <a:rPr lang="en-IN" sz="1800" kern="1200" dirty="0" err="1" smtClean="0"/>
-            <a:t>pD</a:t>
-          </a:r>
-          <a:r>
-            <a:rPr lang="en-IN" sz="1800" kern="1200" dirty="0" smtClean="0"/>
-            <a:t> in DIC1 gives an indication when components are well separated?</a:t>
-          </a:r>
-          <a:endParaRPr lang="en-IN" sz="1800" kern="1200" dirty="0"/>
-        </a:p>
-      </dsp:txBody>
-      <dsp:txXfrm>
-        <a:off x="528859" y="2085901"/>
-        <a:ext cx="6989002" cy="479482"/>
-      </dsp:txXfrm>
-    </dsp:sp>
-    <dsp:sp modelId="{76CE9F42-B308-4DB4-A3D1-BB9B1BB970E6}">
-      <dsp:nvSpPr>
-        <dsp:cNvPr id="0" name=""/>
-        <dsp:cNvSpPr/>
-      </dsp:nvSpPr>
-      <dsp:spPr>
-        <a:xfrm>
-          <a:off x="0" y="3142122"/>
-          <a:ext cx="10058399" cy="453600"/>
-        </a:xfrm>
-        <a:prstGeom prst="rect">
-          <a:avLst/>
-        </a:prstGeom>
-        <a:solidFill>
-          <a:schemeClr val="lt1">
-            <a:alpha val="90000"/>
-            <a:hueOff val="0"/>
-            <a:satOff val="0"/>
-            <a:lumOff val="0"/>
-            <a:alphaOff val="0"/>
-          </a:schemeClr>
-        </a:solidFill>
-        <a:ln w="15875" cap="flat" cmpd="sng" algn="ctr">
-          <a:solidFill>
-            <a:schemeClr val="accent1">
-              <a:hueOff val="0"/>
-              <a:satOff val="0"/>
-              <a:lumOff val="0"/>
-              <a:alphaOff val="0"/>
-            </a:schemeClr>
-          </a:solidFill>
-          <a:prstDash val="solid"/>
-        </a:ln>
-        <a:effectLst/>
-      </dsp:spPr>
-      <dsp:style>
-        <a:lnRef idx="2">
-          <a:scrgbClr r="0" g="0" b="0"/>
-        </a:lnRef>
-        <a:fillRef idx="1">
-          <a:scrgbClr r="0" g="0" b="0"/>
-        </a:fillRef>
-        <a:effectRef idx="0">
-          <a:scrgbClr r="0" g="0" b="0"/>
-        </a:effectRef>
-        <a:fontRef idx="minor"/>
-      </dsp:style>
-    </dsp:sp>
-    <dsp:sp modelId="{4CA68685-41EA-423D-8D51-7D146AA6D434}">
-      <dsp:nvSpPr>
-        <dsp:cNvPr id="0" name=""/>
-        <dsp:cNvSpPr/>
-      </dsp:nvSpPr>
-      <dsp:spPr>
-        <a:xfrm>
-          <a:off x="502920" y="2876442"/>
-          <a:ext cx="7040880" cy="531360"/>
-        </a:xfrm>
-        <a:prstGeom prst="roundRect">
-          <a:avLst/>
-        </a:prstGeom>
-        <a:solidFill>
-          <a:schemeClr val="accent1">
-            <a:hueOff val="0"/>
-            <a:satOff val="0"/>
-            <a:lumOff val="0"/>
-            <a:alphaOff val="0"/>
-          </a:schemeClr>
-        </a:solidFill>
-        <a:ln w="15875" cap="flat" cmpd="sng" algn="ctr">
-          <a:solidFill>
-            <a:schemeClr val="lt1">
-              <a:hueOff val="0"/>
-              <a:satOff val="0"/>
-              <a:lumOff val="0"/>
-              <a:alphaOff val="0"/>
-            </a:schemeClr>
-          </a:solidFill>
-          <a:prstDash val="solid"/>
-        </a:ln>
-        <a:effectLst/>
-      </dsp:spPr>
-      <dsp:style>
-        <a:lnRef idx="2">
-          <a:scrgbClr r="0" g="0" b="0"/>
-        </a:lnRef>
-        <a:fillRef idx="1">
-          <a:scrgbClr r="0" g="0" b="0"/>
-        </a:fillRef>
-        <a:effectRef idx="0">
-          <a:scrgbClr r="0" g="0" b="0"/>
-        </a:effectRef>
-        <a:fontRef idx="minor">
-          <a:schemeClr val="lt1"/>
-        </a:fontRef>
-      </dsp:style>
-      <dsp:txBody>
-        <a:bodyPr spcFirstLastPara="0" vert="horz" wrap="square" lIns="266129" tIns="0" rIns="266129" bIns="0" numCol="1" spcCol="1270" anchor="ctr" anchorCtr="0">
-          <a:noAutofit/>
-        </a:bodyPr>
-        <a:lstStyle/>
-        <a:p>
-          <a:pPr lvl="0" algn="l" defTabSz="800100">
-            <a:lnSpc>
-              <a:spcPct val="90000"/>
-            </a:lnSpc>
-            <a:spcBef>
-              <a:spcPct val="0"/>
-            </a:spcBef>
-            <a:spcAft>
-              <a:spcPct val="35000"/>
-            </a:spcAft>
-          </a:pPr>
-          <a:endParaRPr lang="en-IN" sz="1800" kern="1200" dirty="0"/>
-        </a:p>
-      </dsp:txBody>
-      <dsp:txXfrm>
-        <a:off x="528859" y="2902381"/>
-        <a:ext cx="6989002" cy="479482"/>
-      </dsp:txXfrm>
-    </dsp:sp>
   </dsp:spTree>
 </dsp:drawing>
 </file>
@@ -5810,256 +5346,6 @@
       <dsp:cNvGrpSpPr/>
     </dsp:nvGrpSpPr>
     <dsp:grpSpPr/>
-    <dsp:sp modelId="{19EBEFF9-C7F7-41DA-8673-5438FF827474}">
-      <dsp:nvSpPr>
-        <dsp:cNvPr id="0" name=""/>
-        <dsp:cNvSpPr/>
-      </dsp:nvSpPr>
-      <dsp:spPr>
-        <a:xfrm>
-          <a:off x="0" y="1006962"/>
-          <a:ext cx="10058399" cy="907200"/>
-        </a:xfrm>
-        <a:prstGeom prst="rect">
-          <a:avLst/>
-        </a:prstGeom>
-        <a:solidFill>
-          <a:schemeClr val="lt1">
-            <a:alpha val="90000"/>
-            <a:hueOff val="0"/>
-            <a:satOff val="0"/>
-            <a:lumOff val="0"/>
-            <a:alphaOff val="0"/>
-          </a:schemeClr>
-        </a:solidFill>
-        <a:ln w="15875" cap="flat" cmpd="sng" algn="ctr">
-          <a:solidFill>
-            <a:schemeClr val="accent1">
-              <a:hueOff val="0"/>
-              <a:satOff val="0"/>
-              <a:lumOff val="0"/>
-              <a:alphaOff val="0"/>
-            </a:schemeClr>
-          </a:solidFill>
-          <a:prstDash val="solid"/>
-        </a:ln>
-        <a:effectLst/>
-      </dsp:spPr>
-      <dsp:style>
-        <a:lnRef idx="2">
-          <a:scrgbClr r="0" g="0" b="0"/>
-        </a:lnRef>
-        <a:fillRef idx="1">
-          <a:scrgbClr r="0" g="0" b="0"/>
-        </a:fillRef>
-        <a:effectRef idx="0">
-          <a:scrgbClr r="0" g="0" b="0"/>
-        </a:effectRef>
-        <a:fontRef idx="minor"/>
-      </dsp:style>
-    </dsp:sp>
-    <dsp:sp modelId="{CCAC4913-284D-4267-B389-14932CC72AD9}">
-      <dsp:nvSpPr>
-        <dsp:cNvPr id="0" name=""/>
-        <dsp:cNvSpPr/>
-      </dsp:nvSpPr>
-      <dsp:spPr>
-        <a:xfrm>
-          <a:off x="502920" y="475602"/>
-          <a:ext cx="7040880" cy="1062720"/>
-        </a:xfrm>
-        <a:prstGeom prst="roundRect">
-          <a:avLst/>
-        </a:prstGeom>
-        <a:solidFill>
-          <a:schemeClr val="accent1">
-            <a:hueOff val="0"/>
-            <a:satOff val="0"/>
-            <a:lumOff val="0"/>
-            <a:alphaOff val="0"/>
-          </a:schemeClr>
-        </a:solidFill>
-        <a:ln w="15875" cap="flat" cmpd="sng" algn="ctr">
-          <a:solidFill>
-            <a:schemeClr val="lt1">
-              <a:hueOff val="0"/>
-              <a:satOff val="0"/>
-              <a:lumOff val="0"/>
-              <a:alphaOff val="0"/>
-            </a:schemeClr>
-          </a:solidFill>
-          <a:prstDash val="solid"/>
-        </a:ln>
-        <a:effectLst/>
-      </dsp:spPr>
-      <dsp:style>
-        <a:lnRef idx="2">
-          <a:scrgbClr r="0" g="0" b="0"/>
-        </a:lnRef>
-        <a:fillRef idx="1">
-          <a:scrgbClr r="0" g="0" b="0"/>
-        </a:fillRef>
-        <a:effectRef idx="0">
-          <a:scrgbClr r="0" g="0" b="0"/>
-        </a:effectRef>
-        <a:fontRef idx="minor">
-          <a:schemeClr val="lt1"/>
-        </a:fontRef>
-      </dsp:style>
-      <dsp:txBody>
-        <a:bodyPr spcFirstLastPara="0" vert="horz" wrap="square" lIns="266129" tIns="0" rIns="266129" bIns="0" numCol="1" spcCol="1270" anchor="ctr" anchorCtr="0">
-          <a:noAutofit/>
-        </a:bodyPr>
-        <a:lstStyle/>
-        <a:p>
-          <a:pPr lvl="0" algn="l" defTabSz="1600200">
-            <a:lnSpc>
-              <a:spcPct val="90000"/>
-            </a:lnSpc>
-            <a:spcBef>
-              <a:spcPct val="0"/>
-            </a:spcBef>
-            <a:spcAft>
-              <a:spcPct val="35000"/>
-            </a:spcAft>
-          </a:pPr>
-          <a:r>
-            <a:rPr lang="en-IN" sz="3600" kern="1200" dirty="0" smtClean="0"/>
-            <a:t>JAGS (just another Gibbs sampler)</a:t>
-          </a:r>
-          <a:endParaRPr lang="en-IN" sz="3600" kern="1200" dirty="0"/>
-        </a:p>
-      </dsp:txBody>
-      <dsp:txXfrm>
-        <a:off x="554798" y="527480"/>
-        <a:ext cx="6937124" cy="958964"/>
-      </dsp:txXfrm>
-    </dsp:sp>
-    <dsp:sp modelId="{27A2DFA7-F80A-4DF7-AECA-C814F2629745}">
-      <dsp:nvSpPr>
-        <dsp:cNvPr id="0" name=""/>
-        <dsp:cNvSpPr/>
-      </dsp:nvSpPr>
-      <dsp:spPr>
-        <a:xfrm>
-          <a:off x="0" y="2639922"/>
-          <a:ext cx="10058399" cy="907200"/>
-        </a:xfrm>
-        <a:prstGeom prst="rect">
-          <a:avLst/>
-        </a:prstGeom>
-        <a:solidFill>
-          <a:schemeClr val="lt1">
-            <a:alpha val="90000"/>
-            <a:hueOff val="0"/>
-            <a:satOff val="0"/>
-            <a:lumOff val="0"/>
-            <a:alphaOff val="0"/>
-          </a:schemeClr>
-        </a:solidFill>
-        <a:ln w="15875" cap="flat" cmpd="sng" algn="ctr">
-          <a:solidFill>
-            <a:schemeClr val="accent1">
-              <a:hueOff val="0"/>
-              <a:satOff val="0"/>
-              <a:lumOff val="0"/>
-              <a:alphaOff val="0"/>
-            </a:schemeClr>
-          </a:solidFill>
-          <a:prstDash val="solid"/>
-        </a:ln>
-        <a:effectLst/>
-      </dsp:spPr>
-      <dsp:style>
-        <a:lnRef idx="2">
-          <a:scrgbClr r="0" g="0" b="0"/>
-        </a:lnRef>
-        <a:fillRef idx="1">
-          <a:scrgbClr r="0" g="0" b="0"/>
-        </a:fillRef>
-        <a:effectRef idx="0">
-          <a:scrgbClr r="0" g="0" b="0"/>
-        </a:effectRef>
-        <a:fontRef idx="minor"/>
-      </dsp:style>
-    </dsp:sp>
-    <dsp:sp modelId="{68517EE7-70BC-4FB6-A672-29E09D032A47}">
-      <dsp:nvSpPr>
-        <dsp:cNvPr id="0" name=""/>
-        <dsp:cNvSpPr/>
-      </dsp:nvSpPr>
-      <dsp:spPr>
-        <a:xfrm>
-          <a:off x="502920" y="2108562"/>
-          <a:ext cx="7040880" cy="1062720"/>
-        </a:xfrm>
-        <a:prstGeom prst="roundRect">
-          <a:avLst/>
-        </a:prstGeom>
-        <a:solidFill>
-          <a:schemeClr val="accent1">
-            <a:hueOff val="0"/>
-            <a:satOff val="0"/>
-            <a:lumOff val="0"/>
-            <a:alphaOff val="0"/>
-          </a:schemeClr>
-        </a:solidFill>
-        <a:ln w="15875" cap="flat" cmpd="sng" algn="ctr">
-          <a:solidFill>
-            <a:schemeClr val="lt1">
-              <a:hueOff val="0"/>
-              <a:satOff val="0"/>
-              <a:lumOff val="0"/>
-              <a:alphaOff val="0"/>
-            </a:schemeClr>
-          </a:solidFill>
-          <a:prstDash val="solid"/>
-        </a:ln>
-        <a:effectLst/>
-      </dsp:spPr>
-      <dsp:style>
-        <a:lnRef idx="2">
-          <a:scrgbClr r="0" g="0" b="0"/>
-        </a:lnRef>
-        <a:fillRef idx="1">
-          <a:scrgbClr r="0" g="0" b="0"/>
-        </a:fillRef>
-        <a:effectRef idx="0">
-          <a:scrgbClr r="0" g="0" b="0"/>
-        </a:effectRef>
-        <a:fontRef idx="minor">
-          <a:schemeClr val="lt1"/>
-        </a:fontRef>
-      </dsp:style>
-      <dsp:txBody>
-        <a:bodyPr spcFirstLastPara="0" vert="horz" wrap="square" lIns="266129" tIns="0" rIns="266129" bIns="0" numCol="1" spcCol="1270" anchor="ctr" anchorCtr="0">
-          <a:noAutofit/>
-        </a:bodyPr>
-        <a:lstStyle/>
-        <a:p>
-          <a:pPr lvl="0" algn="l" defTabSz="1600200">
-            <a:lnSpc>
-              <a:spcPct val="90000"/>
-            </a:lnSpc>
-            <a:spcBef>
-              <a:spcPct val="0"/>
-            </a:spcBef>
-            <a:spcAft>
-              <a:spcPct val="35000"/>
-            </a:spcAft>
-          </a:pPr>
-          <a:r>
-            <a:rPr lang="en-IN" sz="3600" kern="1200" dirty="0" smtClean="0"/>
-            <a:t>R and the various packages</a:t>
-          </a:r>
-          <a:endParaRPr lang="en-IN" sz="3600" kern="1200" dirty="0"/>
-        </a:p>
-      </dsp:txBody>
-      <dsp:txXfrm>
-        <a:off x="554798" y="2160440"/>
-        <a:ext cx="6937124" cy="958964"/>
-      </dsp:txXfrm>
-    </dsp:sp>
   </dsp:spTree>
 </dsp:drawing>
 </file>
@@ -11129,7 +10415,7 @@
           <a:p>
             <a:fld id="{3D63F0B7-4086-4782-831C-AF1C749D82D7}" type="datetimeFigureOut">
               <a:rPr lang="en-US"/>
-              <a:t>3/2/2016</a:t>
+              <a:t>3/7/2016</a:t>
             </a:fld>
             <a:endParaRPr lang="en-US"/>
           </a:p>
@@ -11704,7 +10990,7 @@
           <a:p>
             <a:fld id="{5DEC605F-B7B5-4674-B28F-F497069155F3}" type="datetime1">
               <a:rPr lang="en-US" smtClean="0"/>
-              <a:t>3/2/2016</a:t>
+              <a:t>3/7/2016</a:t>
             </a:fld>
             <a:endParaRPr lang="en-US" dirty="0"/>
           </a:p>
@@ -11971,7 +11257,7 @@
           <a:p>
             <a:fld id="{4C9717C8-88C9-46F3-9C17-B8958533C4E1}" type="datetime1">
               <a:rPr lang="en-US" smtClean="0"/>
-              <a:t>3/2/2016</a:t>
+              <a:t>3/7/2016</a:t>
             </a:fld>
             <a:endParaRPr lang="en-US" dirty="0"/>
           </a:p>
@@ -12232,7 +11518,7 @@
           <a:p>
             <a:fld id="{DFB31FA2-3C95-4DA0-8F94-C773F1282CF8}" type="datetime1">
               <a:rPr lang="en-US" smtClean="0"/>
-              <a:t>3/2/2016</a:t>
+              <a:t>3/7/2016</a:t>
             </a:fld>
             <a:endParaRPr lang="en-US" dirty="0"/>
           </a:p>
@@ -12465,7 +11751,7 @@
           <a:p>
             <a:fld id="{96C4D736-4FC0-44DB-B5A6-0A892DCF338F}" type="datetime1">
               <a:rPr lang="en-US" smtClean="0"/>
-              <a:t>3/2/2016</a:t>
+              <a:t>3/7/2016</a:t>
             </a:fld>
             <a:endParaRPr lang="en-US" dirty="0"/>
           </a:p>
@@ -12873,7 +12159,7 @@
           <a:p>
             <a:fld id="{8434BA4B-5710-4911-9B3D-361AE1C407A7}" type="datetime1">
               <a:rPr lang="en-US" smtClean="0"/>
-              <a:t>3/2/2016</a:t>
+              <a:t>3/7/2016</a:t>
             </a:fld>
             <a:endParaRPr lang="en-US" dirty="0"/>
           </a:p>
@@ -13206,7 +12492,7 @@
           <a:p>
             <a:fld id="{E58D5AF2-506B-4141-A603-D2627314BA60}" type="datetime1">
               <a:rPr lang="en-US" smtClean="0"/>
-              <a:t>3/2/2016</a:t>
+              <a:t>3/7/2016</a:t>
             </a:fld>
             <a:endParaRPr lang="en-US" dirty="0"/>
           </a:p>
@@ -13589,7 +12875,7 @@
           <a:p>
             <a:fld id="{8C40E3F5-6B12-4EED-A57B-44737E7E5497}" type="datetime1">
               <a:rPr lang="en-US" smtClean="0"/>
-              <a:t>3/2/2016</a:t>
+              <a:t>3/7/2016</a:t>
             </a:fld>
             <a:endParaRPr lang="en-US" dirty="0"/>
           </a:p>
@@ -13706,7 +12992,7 @@
           <a:p>
             <a:fld id="{2E252D13-B46F-4D3C-9B9E-2F84E2367EE6}" type="datetime1">
               <a:rPr lang="en-US" smtClean="0"/>
-              <a:t>3/2/2016</a:t>
+              <a:t>3/7/2016</a:t>
             </a:fld>
             <a:endParaRPr lang="en-US" dirty="0"/>
           </a:p>
@@ -13877,7 +13163,7 @@
           <a:p>
             <a:fld id="{A06F4D39-EBA1-485E-BCB4-E8BD13DB3677}" type="datetime1">
               <a:rPr lang="en-US" smtClean="0"/>
-              <a:t>3/2/2016</a:t>
+              <a:t>3/7/2016</a:t>
             </a:fld>
             <a:endParaRPr lang="en-US" dirty="0"/>
           </a:p>
@@ -14291,7 +13577,7 @@
           <a:p>
             <a:fld id="{49207368-093B-4F7E-A616-1FF43E4A3B8A}" type="datetime1">
               <a:rPr lang="en-US" smtClean="0"/>
-              <a:t>3/2/2016</a:t>
+              <a:t>3/7/2016</a:t>
             </a:fld>
             <a:endParaRPr lang="en-US" dirty="0"/>
           </a:p>
@@ -14728,7 +14014,7 @@
           <a:p>
             <a:fld id="{94847F1A-F40B-4094-98BB-85D8FC957A3E}" type="datetime1">
               <a:rPr lang="en-US" smtClean="0"/>
-              <a:t>3/2/2016</a:t>
+              <a:t>3/7/2016</a:t>
             </a:fld>
             <a:endParaRPr lang="en-US" dirty="0"/>
           </a:p>
@@ -15074,7 +14360,7 @@
           <a:p>
             <a:fld id="{32136411-0D9C-4584-8A4E-0CB0C8665326}" type="datetime1">
               <a:rPr lang="en-US" smtClean="0"/>
-              <a:t>3/2/2016</a:t>
+              <a:t>3/7/2016</a:t>
             </a:fld>
             <a:endParaRPr lang="en-US" dirty="0"/>
           </a:p>
@@ -19088,11 +18374,7 @@
           <a:p>
             <a:r>
               <a:rPr lang="en-IN" dirty="0" smtClean="0"/>
-              <a:t>Results for 3 well separated </a:t>
-            </a:r>
-            <a:r>
-              <a:rPr lang="en-IN" dirty="0" smtClean="0"/>
-              <a:t>components, un</a:t>
+              <a:t>Results for 3 well separated components, un</a:t>
             </a:r>
             <a:endParaRPr lang="en-IN" dirty="0"/>
           </a:p>
@@ -19304,7 +18586,6 @@
                         <a:rPr lang="en-IN" sz="1200" b="0" dirty="0" smtClean="0"/>
                         <a:t>7028.43</a:t>
                       </a:r>
-                      <a:endParaRPr lang="en-IN" sz="1200" b="0" dirty="0" smtClean="0"/>
                     </a:p>
                     <a:p>
                       <a:r>
@@ -19342,11 +18623,7 @@
                       </a:r>
                       <a:r>
                         <a:rPr lang="en-IN" sz="1200" b="0" dirty="0" smtClean="0"/>
-                        <a:t>11.87</a:t>
-                      </a:r>
-                      <a:r>
-                        <a:rPr lang="en-IN" sz="1200" b="0" dirty="0" smtClean="0"/>
-                        <a:t>)</a:t>
+                        <a:t>11.87)</a:t>
                       </a:r>
                       <a:endParaRPr lang="en-IN" sz="1200" b="0" kern="1200" dirty="0">
                         <a:solidFill>
@@ -19369,7 +18646,6 @@
                         <a:rPr lang="en-IN" sz="1200" b="0" dirty="0" smtClean="0"/>
                         <a:t>7035.24</a:t>
                       </a:r>
-                      <a:endParaRPr lang="en-IN" sz="1200" b="0" dirty="0" smtClean="0"/>
                     </a:p>
                     <a:p>
                       <a:r>
@@ -19441,7 +18717,6 @@
                         <a:rPr lang="en-IN" sz="1200" b="0" dirty="0" smtClean="0"/>
                         <a:t>17040.36</a:t>
                       </a:r>
-                      <a:endParaRPr lang="en-IN" sz="1200" b="0" dirty="0" smtClean="0"/>
                     </a:p>
                     <a:p>
                       <a:r>
@@ -19490,11 +18765,7 @@
                       </a:r>
                       <a:r>
                         <a:rPr lang="en-IN" sz="1200" b="0" dirty="0" smtClean="0"/>
-                        <a:t>25.78</a:t>
-                      </a:r>
-                      <a:r>
-                        <a:rPr lang="en-IN" sz="1200" b="0" dirty="0" smtClean="0"/>
-                        <a:t>)</a:t>
+                        <a:t>25.78)</a:t>
                       </a:r>
                       <a:endParaRPr lang="en-IN" sz="1200" b="0" kern="1200" dirty="0">
                         <a:solidFill>
@@ -19517,7 +18788,6 @@
                         <a:rPr lang="en-IN" sz="1200" b="0" dirty="0" smtClean="0"/>
                         <a:t>17076.01</a:t>
                       </a:r>
-                      <a:endParaRPr lang="en-IN" sz="1200" b="0" dirty="0" smtClean="0"/>
                     </a:p>
                     <a:p>
                       <a:r>
@@ -19555,11 +18825,7 @@
                       </a:r>
                       <a:r>
                         <a:rPr lang="en-IN" sz="1200" b="0" dirty="0" smtClean="0"/>
-                        <a:t>61.43</a:t>
-                      </a:r>
-                      <a:r>
-                        <a:rPr lang="en-IN" sz="1200" b="0" dirty="0" smtClean="0"/>
-                        <a:t>)</a:t>
+                        <a:t>61.43)</a:t>
                       </a:r>
                       <a:endParaRPr lang="en-IN" sz="1200" b="0" kern="1200" dirty="0">
                         <a:solidFill>
@@ -19582,7 +18848,6 @@
                         <a:rPr lang="en-IN" sz="1200" b="0" dirty="0" smtClean="0"/>
                         <a:t>6110.43</a:t>
                       </a:r>
-                      <a:endParaRPr lang="en-IN" sz="1200" b="0" dirty="0" smtClean="0"/>
                     </a:p>
                     <a:p>
                       <a:r>
@@ -19684,7 +18949,6 @@
                         <a:rPr lang="en-IN" sz="1200" b="0" dirty="0" smtClean="0"/>
                         <a:t>7101.44</a:t>
                       </a:r>
-                      <a:endParaRPr lang="en-IN" sz="1200" b="0" dirty="0" smtClean="0"/>
                     </a:p>
                     <a:p>
                       <a:r>
@@ -19697,15 +18961,7 @@
                       </a:r>
                       <a:r>
                         <a:rPr lang="en-IN" sz="1200" b="0" dirty="0" smtClean="0"/>
-                        <a:t> = </a:t>
-                      </a:r>
-                      <a:r>
-                        <a:rPr lang="en-IN" sz="1200" b="0" dirty="0" smtClean="0"/>
-                        <a:t>14.22</a:t>
-                      </a:r>
-                      <a:r>
-                        <a:rPr lang="en-IN" sz="1200" b="0" dirty="0" smtClean="0"/>
-                        <a:t>)</a:t>
+                        <a:t> = 14.22)</a:t>
                       </a:r>
                       <a:endParaRPr lang="en-IN" sz="1200" b="0" kern="1200" dirty="0">
                         <a:solidFill>
@@ -19728,7 +18984,6 @@
                         <a:rPr lang="en-IN" sz="1200" b="0" dirty="0" smtClean="0"/>
                         <a:t>7101.873</a:t>
                       </a:r>
-                      <a:endParaRPr lang="en-IN" sz="1200" b="0" dirty="0" smtClean="0"/>
                     </a:p>
                     <a:p>
                       <a:r>
@@ -19800,7 +19055,6 @@
                         <a:rPr lang="en-IN" sz="1200" b="0" dirty="0" smtClean="0"/>
                         <a:t>17270.44</a:t>
                       </a:r>
-                      <a:endParaRPr lang="en-IN" sz="1200" b="0" dirty="0" smtClean="0"/>
                     </a:p>
                     <a:p>
                       <a:r>
@@ -19838,11 +19092,7 @@
                       </a:r>
                       <a:r>
                         <a:rPr lang="en-IN" sz="1200" b="0" dirty="0" smtClean="0"/>
-                        <a:t>44.16</a:t>
-                      </a:r>
-                      <a:r>
-                        <a:rPr lang="en-IN" sz="1200" b="0" dirty="0" smtClean="0"/>
-                        <a:t>)</a:t>
+                        <a:t>44.16)</a:t>
                       </a:r>
                       <a:endParaRPr lang="en-IN" sz="1200" b="0" kern="1200" dirty="0">
                         <a:solidFill>
@@ -19865,7 +19115,6 @@
                         <a:rPr lang="en-IN" sz="1200" b="0" dirty="0" smtClean="0"/>
                         <a:t>17433.49</a:t>
                       </a:r>
-                      <a:endParaRPr lang="en-IN" sz="1200" b="0" dirty="0" smtClean="0"/>
                     </a:p>
                     <a:p>
                       <a:r>
@@ -19903,11 +19152,7 @@
                       </a:r>
                       <a:r>
                         <a:rPr lang="en-IN" sz="1200" b="0" dirty="0" smtClean="0"/>
-                        <a:t>207.21</a:t>
-                      </a:r>
-                      <a:r>
-                        <a:rPr lang="en-IN" sz="1200" b="0" dirty="0" smtClean="0"/>
-                        <a:t>)</a:t>
+                        <a:t>207.21)</a:t>
                       </a:r>
                       <a:endParaRPr lang="en-IN" sz="1200" b="0" kern="1200" dirty="0">
                         <a:solidFill>
@@ -19930,7 +19175,6 @@
                         <a:rPr lang="en-IN" sz="1200" b="0" dirty="0" smtClean="0"/>
                         <a:t>6061.03</a:t>
                       </a:r>
-                      <a:endParaRPr lang="en-IN" sz="1200" b="0" dirty="0" smtClean="0"/>
                     </a:p>
                     <a:p>
                       <a:r>
@@ -19968,11 +19212,7 @@
                       </a:r>
                       <a:r>
                         <a:rPr lang="en-IN" sz="1200" b="0" dirty="0" smtClean="0"/>
-                        <a:t>-21.71</a:t>
-                      </a:r>
-                      <a:r>
-                        <a:rPr lang="en-IN" sz="1200" b="0" dirty="0" smtClean="0"/>
-                        <a:t>)</a:t>
+                        <a:t>-21.71)</a:t>
                       </a:r>
                       <a:endParaRPr lang="en-IN" sz="1200" b="0" kern="1200" dirty="0">
                         <a:solidFill>
@@ -20318,7 +19558,6 @@
                         <a:rPr lang="en-IN" sz="1200" b="0" dirty="0" smtClean="0"/>
                         <a:t>15586.91</a:t>
                       </a:r>
-                      <a:endParaRPr lang="en-IN" sz="1200" b="0" dirty="0" smtClean="0"/>
                     </a:p>
                     <a:p>
                       <a:r>
@@ -20595,11 +19834,7 @@
                       </a:r>
                       <a:r>
                         <a:rPr lang="en-IN" sz="1200" b="0" dirty="0" smtClean="0"/>
-                        <a:t>7.63</a:t>
-                      </a:r>
-                      <a:r>
-                        <a:rPr lang="en-IN" sz="1200" b="0" dirty="0" smtClean="0"/>
-                        <a:t>)</a:t>
+                        <a:t>7.63)</a:t>
                       </a:r>
                       <a:endParaRPr lang="en-IN" sz="1200" b="0" kern="1200" dirty="0">
                         <a:solidFill>
@@ -20639,7 +19874,6 @@
                         <a:rPr lang="en-IN" sz="1200" b="0" dirty="0" smtClean="0"/>
                         <a:t>7854.453</a:t>
                       </a:r>
-                      <a:endParaRPr lang="en-IN" sz="1200" b="0" dirty="0" smtClean="0"/>
                     </a:p>
                     <a:p>
                       <a:pPr marL="0" marR="0" indent="0" algn="l" defTabSz="914400" rtl="0" eaLnBrk="1" fontAlgn="auto" latinLnBrk="0" hangingPunct="1">
@@ -20745,7 +19979,6 @@
                         <a:rPr lang="en-IN" sz="1200" b="0" dirty="0" smtClean="0"/>
                         <a:t>15658.16</a:t>
                       </a:r>
-                      <a:endParaRPr lang="en-IN" sz="1200" b="0" dirty="0" smtClean="0"/>
                     </a:p>
                     <a:p>
                       <a:pPr marL="0" marR="0" indent="0" algn="l" defTabSz="914400" rtl="0" eaLnBrk="1" fontAlgn="auto" latinLnBrk="0" hangingPunct="1">
@@ -20800,11 +20033,7 @@
                       </a:r>
                       <a:r>
                         <a:rPr lang="en-IN" sz="1200" b="0" dirty="0" smtClean="0"/>
-                        <a:t>77.92</a:t>
-                      </a:r>
-                      <a:r>
-                        <a:rPr lang="en-IN" sz="1200" b="0" dirty="0" smtClean="0"/>
-                        <a:t>)</a:t>
+                        <a:t>77.92)</a:t>
                       </a:r>
                       <a:endParaRPr lang="en-IN" sz="1200" b="0" kern="1200" dirty="0">
                         <a:solidFill>
@@ -20844,7 +20073,6 @@
                         <a:rPr lang="en-IN" sz="1200" b="0" dirty="0" smtClean="0"/>
                         <a:t>16037.37</a:t>
                       </a:r>
-                      <a:endParaRPr lang="en-IN" sz="1200" b="0" dirty="0" smtClean="0"/>
                     </a:p>
                     <a:p>
                       <a:pPr marL="0" marR="0" indent="0" algn="l" defTabSz="914400" rtl="0" eaLnBrk="1" fontAlgn="auto" latinLnBrk="0" hangingPunct="1">
@@ -20950,7 +20178,6 @@
                         <a:rPr lang="en-IN" sz="1200" b="0" dirty="0" smtClean="0"/>
                         <a:t>6189.28</a:t>
                       </a:r>
-                      <a:endParaRPr lang="en-IN" sz="1200" b="0" dirty="0" smtClean="0"/>
                     </a:p>
                     <a:p>
                       <a:pPr marL="0" marR="0" indent="0" algn="l" defTabSz="914400" rtl="0" eaLnBrk="1" fontAlgn="auto" latinLnBrk="0" hangingPunct="1">
@@ -21005,11 +20232,7 @@
                       </a:r>
                       <a:r>
                         <a:rPr lang="en-IN" sz="1200" b="0" dirty="0" smtClean="0"/>
-                        <a:t>105.68</a:t>
-                      </a:r>
-                      <a:r>
-                        <a:rPr lang="en-IN" sz="1200" b="0" dirty="0" smtClean="0"/>
-                        <a:t>)</a:t>
+                        <a:t>105.68)</a:t>
                       </a:r>
                       <a:endParaRPr lang="en-IN" sz="1200" b="0" kern="1200" dirty="0">
                         <a:solidFill>
@@ -21096,7 +20319,6 @@
                         <a:rPr lang="en-IN" sz="1200" b="0" dirty="0" smtClean="0"/>
                         <a:t>7624.78</a:t>
                       </a:r>
-                      <a:endParaRPr lang="en-IN" sz="1200" b="0" dirty="0" smtClean="0"/>
                     </a:p>
                     <a:p>
                       <a:pPr marL="0" marR="0" indent="0" algn="l" defTabSz="914400" rtl="0" eaLnBrk="1" fontAlgn="auto" latinLnBrk="0" hangingPunct="1">
@@ -21151,11 +20373,7 @@
                       </a:r>
                       <a:r>
                         <a:rPr lang="en-IN" sz="1200" b="0" dirty="0" smtClean="0"/>
-                        <a:t>-162.35</a:t>
-                      </a:r>
-                      <a:r>
-                        <a:rPr lang="en-IN" sz="1200" b="0" dirty="0" smtClean="0"/>
-                        <a:t>)</a:t>
+                        <a:t>-162.35)</a:t>
                       </a:r>
                       <a:endParaRPr lang="en-IN" sz="1200" b="0" kern="1200" dirty="0">
                         <a:solidFill>
@@ -21195,7 +20413,6 @@
                         <a:rPr lang="en-IN" sz="1200" b="0" dirty="0" smtClean="0"/>
                         <a:t>7816.59</a:t>
                       </a:r>
-                      <a:endParaRPr lang="en-IN" sz="1200" b="0" dirty="0" smtClean="0"/>
                     </a:p>
                     <a:p>
                       <a:pPr marL="0" marR="0" indent="0" algn="l" defTabSz="914400" rtl="0" eaLnBrk="1" fontAlgn="auto" latinLnBrk="0" hangingPunct="1">
@@ -21250,11 +20467,7 @@
                       </a:r>
                       <a:r>
                         <a:rPr lang="en-IN" sz="1200" b="0" dirty="0" smtClean="0"/>
-                        <a:t>29.45</a:t>
-                      </a:r>
-                      <a:r>
-                        <a:rPr lang="en-IN" sz="1200" b="0" dirty="0" smtClean="0"/>
-                        <a:t>)</a:t>
+                        <a:t>29.45)</a:t>
                       </a:r>
                       <a:endParaRPr lang="en-IN" sz="1200" b="0" kern="1200" dirty="0">
                         <a:solidFill>
@@ -21294,7 +20507,6 @@
                         <a:rPr lang="en-IN" sz="1200" b="0" dirty="0" smtClean="0"/>
                         <a:t>15880.63</a:t>
                       </a:r>
-                      <a:endParaRPr lang="en-IN" sz="1200" b="0" dirty="0" smtClean="0"/>
                     </a:p>
                     <a:p>
                       <a:pPr marL="0" marR="0" indent="0" algn="l" defTabSz="914400" rtl="0" eaLnBrk="1" fontAlgn="auto" latinLnBrk="0" hangingPunct="1">
@@ -21349,11 +20561,7 @@
                       </a:r>
                       <a:r>
                         <a:rPr lang="en-IN" sz="1200" b="0" dirty="0" smtClean="0"/>
-                        <a:t>85.80</a:t>
-                      </a:r>
-                      <a:r>
-                        <a:rPr lang="en-IN" sz="1200" b="0" dirty="0" smtClean="0"/>
-                        <a:t>)</a:t>
+                        <a:t>85.80)</a:t>
                       </a:r>
                       <a:endParaRPr lang="en-IN" sz="1200" b="0" kern="1200" dirty="0">
                         <a:solidFill>
@@ -21393,7 +20601,6 @@
                         <a:rPr lang="en-IN" sz="1200" b="0" dirty="0" smtClean="0"/>
                         <a:t>12865.95</a:t>
                       </a:r>
-                      <a:endParaRPr lang="en-IN" sz="1200" b="0" dirty="0" smtClean="0"/>
                     </a:p>
                     <a:p>
                       <a:pPr marL="0" marR="0" indent="0" algn="l" defTabSz="914400" rtl="0" eaLnBrk="1" fontAlgn="auto" latinLnBrk="0" hangingPunct="1">
@@ -21499,7 +20706,6 @@
                         <a:rPr lang="en-IN" sz="1200" b="0" dirty="0" smtClean="0"/>
                         <a:t>6191.27</a:t>
                       </a:r>
-                      <a:endParaRPr lang="en-IN" sz="1200" b="0" dirty="0" smtClean="0"/>
                     </a:p>
                     <a:p>
                       <a:pPr marL="0" marR="0" indent="0" algn="l" defTabSz="914400" rtl="0" eaLnBrk="1" fontAlgn="auto" latinLnBrk="0" hangingPunct="1">
@@ -21554,11 +20760,7 @@
                       </a:r>
                       <a:r>
                         <a:rPr lang="en-IN" sz="1200" b="0" dirty="0" smtClean="0"/>
-                        <a:t>108.37</a:t>
-                      </a:r>
-                      <a:r>
-                        <a:rPr lang="en-IN" sz="1200" b="0" dirty="0" smtClean="0"/>
-                        <a:t>)</a:t>
+                        <a:t>108.37)</a:t>
                       </a:r>
                       <a:endParaRPr lang="en-IN" sz="1200" b="0" kern="1200" dirty="0">
                         <a:solidFill>
@@ -25049,7 +24251,6 @@
                         <a:rPr lang="en-IN" sz="1200" b="0" dirty="0" smtClean="0"/>
                         <a:t>7478.89</a:t>
                       </a:r>
-                      <a:endParaRPr lang="en-IN" sz="1200" b="0" dirty="0" smtClean="0"/>
                     </a:p>
                     <a:p>
                       <a:r>
@@ -25087,11 +24288,7 @@
                       </a:r>
                       <a:r>
                         <a:rPr lang="en-IN" sz="1200" b="0" dirty="0" smtClean="0"/>
-                        <a:t>13.23</a:t>
-                      </a:r>
-                      <a:r>
-                        <a:rPr lang="en-IN" sz="1200" b="0" dirty="0" smtClean="0"/>
-                        <a:t>)</a:t>
+                        <a:t>13.23)</a:t>
                       </a:r>
                       <a:endParaRPr lang="en-IN" sz="1200" b="0" kern="1200" dirty="0">
                         <a:solidFill>
@@ -25114,7 +24311,6 @@
                         <a:rPr lang="en-IN" sz="1200" b="0" dirty="0" smtClean="0"/>
                         <a:t>7476.65</a:t>
                       </a:r>
-                      <a:endParaRPr lang="en-IN" sz="1200" b="0" dirty="0" smtClean="0"/>
                     </a:p>
                     <a:p>
                       <a:r>
@@ -25186,7 +24382,6 @@
                         <a:rPr lang="en-IN" sz="1200" b="0" dirty="0" smtClean="0"/>
                         <a:t>15304.93</a:t>
                       </a:r>
-                      <a:endParaRPr lang="en-IN" sz="1200" b="0" dirty="0" smtClean="0"/>
                     </a:p>
                     <a:p>
                       <a:r>
@@ -25235,11 +24430,7 @@
                       </a:r>
                       <a:r>
                         <a:rPr lang="en-IN" sz="1200" b="0" dirty="0" smtClean="0"/>
-                        <a:t>26.31</a:t>
-                      </a:r>
-                      <a:r>
-                        <a:rPr lang="en-IN" sz="1200" b="0" dirty="0" smtClean="0"/>
-                        <a:t>)</a:t>
+                        <a:t>26.31)</a:t>
                       </a:r>
                       <a:endParaRPr lang="en-IN" sz="1200" b="0" kern="1200" dirty="0">
                         <a:solidFill>
@@ -25262,7 +24453,6 @@
                         <a:rPr lang="en-IN" sz="1200" b="0" dirty="0" smtClean="0"/>
                         <a:t>15428.91</a:t>
                       </a:r>
-                      <a:endParaRPr lang="en-IN" sz="1200" b="0" dirty="0" smtClean="0"/>
                     </a:p>
                     <a:p>
                       <a:r>
@@ -25300,11 +24490,7 @@
                       </a:r>
                       <a:r>
                         <a:rPr lang="en-IN" sz="1200" b="0" dirty="0" smtClean="0"/>
-                        <a:t>150.29</a:t>
-                      </a:r>
-                      <a:r>
-                        <a:rPr lang="en-IN" sz="1200" b="0" dirty="0" smtClean="0"/>
-                        <a:t>)</a:t>
+                        <a:t>150.29)</a:t>
                       </a:r>
                       <a:endParaRPr lang="en-IN" sz="1200" b="0" kern="1200" dirty="0">
                         <a:solidFill>
@@ -25327,7 +24513,6 @@
                         <a:rPr lang="en-IN" sz="1200" b="0" dirty="0" smtClean="0"/>
                         <a:t>6183.127</a:t>
                       </a:r>
-                      <a:endParaRPr lang="en-IN" sz="1200" b="0" dirty="0" smtClean="0"/>
                     </a:p>
                     <a:p>
                       <a:r>
@@ -25429,7 +24614,6 @@
                         <a:rPr lang="en-IN" sz="1200" b="0" dirty="0" smtClean="0"/>
                         <a:t>8300.28</a:t>
                       </a:r>
-                      <a:endParaRPr lang="en-IN" sz="1200" b="0" dirty="0" smtClean="0"/>
                     </a:p>
                     <a:p>
                       <a:r>
@@ -25442,15 +24626,7 @@
                       </a:r>
                       <a:r>
                         <a:rPr lang="en-IN" sz="1200" b="0" dirty="0" smtClean="0"/>
-                        <a:t> = </a:t>
-                      </a:r>
-                      <a:r>
-                        <a:rPr lang="en-IN" sz="1200" b="0" dirty="0" smtClean="0"/>
-                        <a:t>6.79</a:t>
-                      </a:r>
-                      <a:r>
-                        <a:rPr lang="en-IN" sz="1200" b="0" dirty="0" smtClean="0"/>
-                        <a:t>)</a:t>
+                        <a:t> = 6.79)</a:t>
                       </a:r>
                       <a:endParaRPr lang="en-IN" sz="1200" b="0" kern="1200" dirty="0">
                         <a:solidFill>
@@ -25473,7 +24649,6 @@
                         <a:rPr lang="en-IN" sz="1200" b="0" dirty="0" smtClean="0"/>
                         <a:t>8383.95</a:t>
                       </a:r>
-                      <a:endParaRPr lang="en-IN" sz="1200" b="0" dirty="0" smtClean="0"/>
                     </a:p>
                     <a:p>
                       <a:r>
@@ -25545,7 +24720,6 @@
                         <a:rPr lang="en-IN" sz="1200" b="0" dirty="0" smtClean="0"/>
                         <a:t>15582.35</a:t>
                       </a:r>
-                      <a:endParaRPr lang="en-IN" sz="1200" b="0" dirty="0" smtClean="0"/>
                     </a:p>
                     <a:p>
                       <a:r>
@@ -25583,11 +24757,7 @@
                       </a:r>
                       <a:r>
                         <a:rPr lang="en-IN" sz="1200" b="0" dirty="0" smtClean="0"/>
-                        <a:t>43.18</a:t>
-                      </a:r>
-                      <a:r>
-                        <a:rPr lang="en-IN" sz="1200" b="0" dirty="0" smtClean="0"/>
-                        <a:t>)</a:t>
+                        <a:t>43.18)</a:t>
                       </a:r>
                       <a:endParaRPr lang="en-IN" sz="1200" b="0" kern="1200" dirty="0">
                         <a:solidFill>
@@ -25610,7 +24780,6 @@
                         <a:rPr lang="en-IN" sz="1200" b="0" dirty="0" smtClean="0"/>
                         <a:t>15931.90</a:t>
                       </a:r>
-                      <a:endParaRPr lang="en-IN" sz="1200" b="0" dirty="0" smtClean="0"/>
                     </a:p>
                     <a:p>
                       <a:r>
@@ -25648,11 +24817,7 @@
                       </a:r>
                       <a:r>
                         <a:rPr lang="en-IN" sz="1200" b="0" dirty="0" smtClean="0"/>
-                        <a:t>392.74</a:t>
-                      </a:r>
-                      <a:r>
-                        <a:rPr lang="en-IN" sz="1200" b="0" dirty="0" smtClean="0"/>
-                        <a:t>)</a:t>
+                        <a:t>392.74)</a:t>
                       </a:r>
                       <a:endParaRPr lang="en-IN" sz="1200" b="0" kern="1200" dirty="0">
                         <a:solidFill>
@@ -25675,7 +24840,6 @@
                         <a:rPr lang="en-IN" sz="1200" b="0" dirty="0" smtClean="0"/>
                         <a:t>6181.79</a:t>
                       </a:r>
-                      <a:endParaRPr lang="en-IN" sz="1200" b="0" dirty="0" smtClean="0"/>
                     </a:p>
                     <a:p>
                       <a:r>
@@ -25713,11 +24877,7 @@
                       </a:r>
                       <a:r>
                         <a:rPr lang="en-IN" sz="1200" b="0" dirty="0" smtClean="0"/>
-                        <a:t>104.65</a:t>
-                      </a:r>
-                      <a:r>
-                        <a:rPr lang="en-IN" sz="1200" b="0" dirty="0" smtClean="0"/>
-                        <a:t>)</a:t>
+                        <a:t>104.65)</a:t>
                       </a:r>
                       <a:endParaRPr lang="en-IN" sz="1200" b="0" kern="1200" dirty="0">
                         <a:solidFill>
@@ -25787,7 +24947,6 @@
                         <a:rPr lang="en-IN" sz="1200" b="0" dirty="0" smtClean="0"/>
                         <a:t>9284.91</a:t>
                       </a:r>
-                      <a:endParaRPr lang="en-IN" sz="1200" b="0" dirty="0" smtClean="0"/>
                     </a:p>
                     <a:p>
                       <a:pPr marL="0" marR="0" indent="0" algn="l" defTabSz="914400" rtl="0" eaLnBrk="1" fontAlgn="auto" latinLnBrk="0" hangingPunct="1">
@@ -25955,7 +25114,6 @@
                         <a:rPr lang="en-IN" sz="1200" b="0" dirty="0" smtClean="0"/>
                         <a:t>15528.08</a:t>
                       </a:r>
-                      <a:endParaRPr lang="en-IN" sz="1200" b="0" dirty="0" smtClean="0"/>
                     </a:p>
                     <a:p>
                       <a:r>
@@ -26027,7 +25185,6 @@
                         <a:rPr lang="en-IN" sz="1200" b="0" dirty="0" smtClean="0"/>
                         <a:t>15995.44</a:t>
                       </a:r>
-                      <a:endParaRPr lang="en-IN" sz="1200" b="0" dirty="0" smtClean="0"/>
                     </a:p>
                     <a:p>
                       <a:r>
@@ -26234,7 +25391,6 @@
                         <a:rPr lang="en-IN" sz="1200" b="0" dirty="0" smtClean="0"/>
                         <a:t>10047.85</a:t>
                       </a:r>
-                      <a:endParaRPr lang="en-IN" sz="1200" b="0" dirty="0" smtClean="0"/>
                     </a:p>
                     <a:p>
                       <a:pPr marL="0" marR="0" indent="0" algn="l" defTabSz="914400" rtl="0" eaLnBrk="1" fontAlgn="auto" latinLnBrk="0" hangingPunct="1">
@@ -26289,11 +25445,7 @@
                       </a:r>
                       <a:r>
                         <a:rPr lang="en-IN" sz="1200" b="0" dirty="0" smtClean="0"/>
-                        <a:t>182.57</a:t>
-                      </a:r>
-                      <a:r>
-                        <a:rPr lang="en-IN" sz="1200" b="0" dirty="0" smtClean="0"/>
-                        <a:t>)</a:t>
+                        <a:t>182.57)</a:t>
                       </a:r>
                       <a:endParaRPr lang="en-IN" sz="1200" b="0" kern="1200" dirty="0">
                         <a:solidFill>
@@ -26333,7 +25485,6 @@
                         <a:rPr lang="en-IN" sz="1200" b="0" dirty="0" smtClean="0"/>
                         <a:t>9762.34</a:t>
                       </a:r>
-                      <a:endParaRPr lang="en-IN" sz="1200" b="0" dirty="0" smtClean="0"/>
                     </a:p>
                     <a:p>
                       <a:pPr marL="0" marR="0" indent="0" algn="l" defTabSz="914400" rtl="0" eaLnBrk="1" fontAlgn="auto" latinLnBrk="0" hangingPunct="1">
@@ -26439,7 +25590,6 @@
                         <a:rPr lang="en-IN" sz="1200" b="0" dirty="0" smtClean="0"/>
                         <a:t>15670.82</a:t>
                       </a:r>
-                      <a:endParaRPr lang="en-IN" sz="1200" b="0" dirty="0" smtClean="0"/>
                     </a:p>
                     <a:p>
                       <a:pPr marL="0" marR="0" indent="0" algn="l" defTabSz="914400" rtl="0" eaLnBrk="1" fontAlgn="auto" latinLnBrk="0" hangingPunct="1">
@@ -26494,11 +25644,7 @@
                       </a:r>
                       <a:r>
                         <a:rPr lang="en-IN" sz="1200" b="0" dirty="0" smtClean="0"/>
-                        <a:t>76.11</a:t>
-                      </a:r>
-                      <a:r>
-                        <a:rPr lang="en-IN" sz="1200" b="0" dirty="0" smtClean="0"/>
-                        <a:t>)</a:t>
+                        <a:t>76.11)</a:t>
                       </a:r>
                       <a:endParaRPr lang="en-IN" sz="1200" b="0" kern="1200" dirty="0">
                         <a:solidFill>
@@ -26538,7 +25684,6 @@
                         <a:rPr lang="en-IN" sz="1200" b="0" dirty="0" smtClean="0"/>
                         <a:t>13523.96</a:t>
                       </a:r>
-                      <a:endParaRPr lang="en-IN" sz="1200" b="0" dirty="0" smtClean="0"/>
                     </a:p>
                     <a:p>
                       <a:pPr marL="0" marR="0" indent="0" algn="l" defTabSz="914400" rtl="0" eaLnBrk="1" fontAlgn="auto" latinLnBrk="0" hangingPunct="1">
@@ -26644,7 +25789,6 @@
                         <a:rPr lang="en-IN" sz="1200" b="0" dirty="0" smtClean="0"/>
                         <a:t>6186.42</a:t>
                       </a:r>
-                      <a:endParaRPr lang="en-IN" sz="1200" b="0" dirty="0" smtClean="0"/>
                     </a:p>
                     <a:p>
                       <a:pPr marL="0" marR="0" indent="0" algn="l" defTabSz="914400" rtl="0" eaLnBrk="1" fontAlgn="auto" latinLnBrk="0" hangingPunct="1">
@@ -26699,11 +25843,7 @@
                       </a:r>
                       <a:r>
                         <a:rPr lang="en-IN" sz="1200" b="0" dirty="0" smtClean="0"/>
-                        <a:t>109.33</a:t>
-                      </a:r>
-                      <a:r>
-                        <a:rPr lang="en-IN" sz="1200" b="0" dirty="0" smtClean="0"/>
-                        <a:t>)</a:t>
+                        <a:t>109.33)</a:t>
                       </a:r>
                       <a:endParaRPr lang="en-IN" sz="1200" b="0" kern="1200" dirty="0">
                         <a:solidFill>
@@ -26878,65 +26018,373 @@
           <a:chExt cx="0" cy="0"/>
         </a:xfrm>
       </p:grpSpPr>
-      <p:sp>
-        <p:nvSpPr>
-          <p:cNvPr id="2" name="Title 1"/>
-          <p:cNvSpPr>
-            <a:spLocks noGrp="1"/>
-          </p:cNvSpPr>
-          <p:nvPr>
-            <p:ph type="title"/>
-          </p:nvPr>
-        </p:nvSpPr>
-        <p:spPr/>
-        <p:txBody>
-          <a:bodyPr/>
-          <a:lstStyle/>
-          <a:p>
-            <a:r>
-              <a:rPr lang="en-IN" dirty="0" smtClean="0"/>
-              <a:t>Discussion</a:t>
-            </a:r>
-            <a:endParaRPr lang="en-IN" dirty="0"/>
-          </a:p>
-        </p:txBody>
-      </p:sp>
-      <p:sp>
-        <p:nvSpPr>
-          <p:cNvPr id="3" name="Content Placeholder 2"/>
-          <p:cNvSpPr>
-            <a:spLocks noGrp="1"/>
-          </p:cNvSpPr>
-          <p:nvPr>
-            <p:ph idx="1"/>
-          </p:nvPr>
-        </p:nvSpPr>
-        <p:spPr/>
-        <p:txBody>
-          <a:bodyPr/>
-          <a:lstStyle/>
-          <a:p>
-            <a:r>
-              <a:rPr lang="en-IN" dirty="0" smtClean="0"/>
-              <a:t>Talk about negative </a:t>
-            </a:r>
-            <a:r>
-              <a:rPr lang="en-IN" dirty="0" err="1" smtClean="0"/>
-              <a:t>pD</a:t>
-            </a:r>
-            <a:endParaRPr lang="en-IN" dirty="0" smtClean="0"/>
-          </a:p>
-          <a:p>
-            <a:r>
-              <a:rPr lang="en-IN" dirty="0" smtClean="0"/>
-              <a:t>What are the equations and results.</a:t>
-            </a:r>
-          </a:p>
-          <a:p>
-            <a:endParaRPr lang="en-IN" dirty="0"/>
-          </a:p>
-        </p:txBody>
-      </p:sp>
+      <mc:AlternateContent xmlns:mc="http://schemas.openxmlformats.org/markup-compatibility/2006" xmlns:a14="http://schemas.microsoft.com/office/drawing/2010/main">
+        <mc:Choice Requires="a14">
+          <p:sp>
+            <p:nvSpPr>
+              <p:cNvPr id="2" name="Title 1"/>
+              <p:cNvSpPr>
+                <a:spLocks noGrp="1"/>
+              </p:cNvSpPr>
+              <p:nvPr>
+                <p:ph type="title"/>
+              </p:nvPr>
+            </p:nvSpPr>
+            <p:spPr/>
+            <p:txBody>
+              <a:bodyPr/>
+              <a:lstStyle/>
+              <a:p>
+                <a:r>
+                  <a:rPr lang="en-IN" dirty="0" smtClean="0"/>
+                  <a:t>Posterior checks for </a:t>
+                </a:r>
+                <a14:m>
+                  <m:oMath xmlns:m="http://schemas.openxmlformats.org/officeDocument/2006/math">
+                    <m:r>
+                      <a:rPr lang="en-IN" b="0" i="1" smtClean="0">
+                        <a:latin typeface="Cambria Math" panose="02040503050406030204" pitchFamily="18" charset="0"/>
+                      </a:rPr>
+                      <m:t>𝑝</m:t>
+                    </m:r>
+                    <m:d>
+                      <m:dPr>
+                        <m:ctrlPr>
+                          <a:rPr lang="en-IN" b="0" i="1" smtClean="0">
+                            <a:latin typeface="Cambria Math" panose="02040503050406030204" pitchFamily="18" charset="0"/>
+                          </a:rPr>
+                        </m:ctrlPr>
+                      </m:dPr>
+                      <m:e>
+                        <m:r>
+                          <a:rPr lang="en-IN" b="0" i="1" smtClean="0">
+                            <a:latin typeface="Cambria Math" panose="02040503050406030204" pitchFamily="18" charset="0"/>
+                          </a:rPr>
+                          <m:t>𝜃</m:t>
+                        </m:r>
+                      </m:e>
+                      <m:e>
+                        <m:r>
+                          <a:rPr lang="en-IN" b="0" i="1" smtClean="0">
+                            <a:latin typeface="Cambria Math" panose="02040503050406030204" pitchFamily="18" charset="0"/>
+                          </a:rPr>
+                          <m:t>𝑦</m:t>
+                        </m:r>
+                      </m:e>
+                    </m:d>
+                  </m:oMath>
+                </a14:m>
+                <a:r>
+                  <a:rPr lang="en-IN" dirty="0" smtClean="0"/>
+                  <a:t>and </a:t>
+                </a:r>
+                <a14:m>
+                  <m:oMath xmlns:m="http://schemas.openxmlformats.org/officeDocument/2006/math">
+                    <m:r>
+                      <a:rPr lang="en-IN" b="0" i="1" smtClean="0">
+                        <a:latin typeface="Cambria Math" panose="02040503050406030204" pitchFamily="18" charset="0"/>
+                      </a:rPr>
+                      <m:t>𝑝</m:t>
+                    </m:r>
+                    <m:r>
+                      <a:rPr lang="en-IN" b="0" i="1" smtClean="0">
+                        <a:latin typeface="Cambria Math" panose="02040503050406030204" pitchFamily="18" charset="0"/>
+                      </a:rPr>
+                      <m:t>(</m:t>
+                    </m:r>
+                    <m:sSup>
+                      <m:sSupPr>
+                        <m:ctrlPr>
+                          <a:rPr lang="en-IN" b="0" i="1" smtClean="0">
+                            <a:latin typeface="Cambria Math" panose="02040503050406030204" pitchFamily="18" charset="0"/>
+                          </a:rPr>
+                        </m:ctrlPr>
+                      </m:sSupPr>
+                      <m:e>
+                        <m:r>
+                          <a:rPr lang="en-IN" b="0" i="1" smtClean="0">
+                            <a:latin typeface="Cambria Math" panose="02040503050406030204" pitchFamily="18" charset="0"/>
+                          </a:rPr>
+                          <m:t>𝑦</m:t>
+                        </m:r>
+                      </m:e>
+                      <m:sup>
+                        <m:r>
+                          <a:rPr lang="en-IN" b="0" i="1" smtClean="0">
+                            <a:latin typeface="Cambria Math" panose="02040503050406030204" pitchFamily="18" charset="0"/>
+                          </a:rPr>
+                          <m:t>𝑓</m:t>
+                        </m:r>
+                      </m:sup>
+                    </m:sSup>
+                    <m:r>
+                      <a:rPr lang="en-IN" b="0" i="1" smtClean="0">
+                        <a:latin typeface="Cambria Math" panose="02040503050406030204" pitchFamily="18" charset="0"/>
+                      </a:rPr>
+                      <m:t>|</m:t>
+                    </m:r>
+                    <m:r>
+                      <a:rPr lang="en-IN" b="0" i="1" smtClean="0">
+                        <a:latin typeface="Cambria Math" panose="02040503050406030204" pitchFamily="18" charset="0"/>
+                      </a:rPr>
+                      <m:t>𝑦</m:t>
+                    </m:r>
+                    <m:r>
+                      <a:rPr lang="en-IN" b="0" i="1" smtClean="0">
+                        <a:latin typeface="Cambria Math" panose="02040503050406030204" pitchFamily="18" charset="0"/>
+                      </a:rPr>
+                      <m:t>)</m:t>
+                    </m:r>
+                  </m:oMath>
+                </a14:m>
+                <a:endParaRPr lang="en-IN" dirty="0"/>
+              </a:p>
+            </p:txBody>
+          </p:sp>
+        </mc:Choice>
+        <mc:Fallback xmlns="">
+          <p:sp>
+            <p:nvSpPr>
+              <p:cNvPr id="2" name="Title 1"/>
+              <p:cNvSpPr>
+                <a:spLocks noGrp="1" noRot="1" noChangeAspect="1" noMove="1" noResize="1" noEditPoints="1" noAdjustHandles="1" noChangeArrowheads="1" noChangeShapeType="1" noTextEdit="1"/>
+              </p:cNvSpPr>
+              <p:nvPr>
+                <p:ph type="title"/>
+              </p:nvPr>
+            </p:nvSpPr>
+            <p:spPr>
+              <a:blipFill rotWithShape="0">
+                <a:blip r:embed="rId2"/>
+                <a:stretch>
+                  <a:fillRect l="-2121" b="-18487"/>
+                </a:stretch>
+              </a:blipFill>
+            </p:spPr>
+            <p:txBody>
+              <a:bodyPr/>
+              <a:lstStyle/>
+              <a:p>
+                <a:r>
+                  <a:rPr lang="en-IN">
+                    <a:noFill/>
+                  </a:rPr>
+                  <a:t> </a:t>
+                </a:r>
+              </a:p>
+            </p:txBody>
+          </p:sp>
+        </mc:Fallback>
+      </mc:AlternateContent>
+      <mc:AlternateContent xmlns:mc="http://schemas.openxmlformats.org/markup-compatibility/2006">
+        <mc:Choice xmlns:a14="http://schemas.microsoft.com/office/drawing/2010/main" Requires="a14">
+          <p:sp>
+            <p:nvSpPr>
+              <p:cNvPr id="3" name="Content Placeholder 2"/>
+              <p:cNvSpPr>
+                <a:spLocks noGrp="1"/>
+              </p:cNvSpPr>
+              <p:nvPr>
+                <p:ph idx="1"/>
+              </p:nvPr>
+            </p:nvSpPr>
+            <p:spPr/>
+            <p:txBody>
+              <a:bodyPr>
+                <a:normAutofit lnSpcReduction="10000"/>
+              </a:bodyPr>
+              <a:lstStyle/>
+              <a:p>
+                <a:r>
+                  <a:rPr lang="en-IN" dirty="0" smtClean="0"/>
+                  <a:t>Multivariate normality for </a:t>
+                </a:r>
+                <a14:m>
+                  <m:oMath xmlns:m="http://schemas.openxmlformats.org/officeDocument/2006/math">
+                    <m:r>
+                      <a:rPr lang="en-IN" b="0" i="1" smtClean="0">
+                        <a:latin typeface="Cambria Math" panose="02040503050406030204" pitchFamily="18" charset="0"/>
+                      </a:rPr>
+                      <m:t>𝑝</m:t>
+                    </m:r>
+                    <m:d>
+                      <m:dPr>
+                        <m:ctrlPr>
+                          <a:rPr lang="en-IN" b="0" i="1" smtClean="0">
+                            <a:latin typeface="Cambria Math" panose="02040503050406030204" pitchFamily="18" charset="0"/>
+                          </a:rPr>
+                        </m:ctrlPr>
+                      </m:dPr>
+                      <m:e>
+                        <m:r>
+                          <a:rPr lang="en-IN" b="0" i="1" smtClean="0">
+                            <a:latin typeface="Cambria Math" panose="02040503050406030204" pitchFamily="18" charset="0"/>
+                          </a:rPr>
+                          <m:t>𝜇</m:t>
+                        </m:r>
+                      </m:e>
+                      <m:e>
+                        <m:r>
+                          <a:rPr lang="en-IN" b="0" i="1" smtClean="0">
+                            <a:latin typeface="Cambria Math" panose="02040503050406030204" pitchFamily="18" charset="0"/>
+                          </a:rPr>
+                          <m:t>𝑦</m:t>
+                        </m:r>
+                      </m:e>
+                    </m:d>
+                  </m:oMath>
+                </a14:m>
+                <a:r>
+                  <a:rPr lang="en-IN" dirty="0" smtClean="0"/>
+                  <a:t>?</a:t>
+                </a:r>
+              </a:p>
+              <a:p>
+                <a:r>
+                  <a:rPr lang="en-IN" dirty="0" smtClean="0"/>
+                  <a:t>Are the mixture proportions correctly identified? </a:t>
+                </a:r>
+              </a:p>
+              <a:p>
+                <a:r>
+                  <a:rPr lang="en-IN" dirty="0" smtClean="0"/>
+                  <a:t>(check the posterior predictive distributions mean)</a:t>
+                </a:r>
+              </a:p>
+              <a:p>
+                <a:r>
+                  <a:rPr lang="en-IN" dirty="0" smtClean="0"/>
+                  <a:t>How about looking at convergence? Running mean </a:t>
+                </a:r>
+                <a:r>
+                  <a:rPr lang="en-IN" dirty="0" err="1" smtClean="0"/>
+                  <a:t>etc</a:t>
+                </a:r>
+                <a:endParaRPr lang="en-IN" dirty="0" smtClean="0"/>
+              </a:p>
+              <a:p>
+                <a:r>
+                  <a:rPr lang="en-IN" dirty="0" smtClean="0">
+                    <a:solidFill>
+                      <a:srgbClr val="FF0000"/>
+                    </a:solidFill>
+                  </a:rPr>
+                  <a:t>Mean, min, max are affected in terms of the width of 95%HPDI. they become wider if you tried more components than needed….other moments don’t seem to be that affected in this sense</a:t>
+                </a:r>
+              </a:p>
+              <a:p>
+                <a:r>
+                  <a:rPr lang="en-IN" dirty="0" smtClean="0">
+                    <a:solidFill>
+                      <a:srgbClr val="FF0000"/>
+                    </a:solidFill>
+                  </a:rPr>
+                  <a:t>If you have less components than needed then the higher order moments are not in the </a:t>
+                </a:r>
+                <a:r>
+                  <a:rPr lang="en-IN" dirty="0" smtClean="0">
+                    <a:solidFill>
+                      <a:srgbClr val="FF0000"/>
+                    </a:solidFill>
+                  </a:rPr>
+                  <a:t>95%HPDI…..</a:t>
+                </a:r>
+                <a:r>
+                  <a:rPr lang="en-IN" dirty="0" err="1" smtClean="0">
+                    <a:solidFill>
+                      <a:srgbClr val="FF0000"/>
+                    </a:solidFill>
+                  </a:rPr>
+                  <a:t>Mardia’s</a:t>
+                </a:r>
+                <a:r>
+                  <a:rPr lang="en-IN" dirty="0" smtClean="0">
+                    <a:solidFill>
+                      <a:srgbClr val="FF0000"/>
+                    </a:solidFill>
+                  </a:rPr>
+                  <a:t> test skewness vs. kurtosis </a:t>
+                </a:r>
+                <a:r>
+                  <a:rPr lang="en-IN" dirty="0" err="1" smtClean="0">
+                    <a:solidFill>
+                      <a:srgbClr val="FF0000"/>
+                    </a:solidFill>
+                  </a:rPr>
+                  <a:t>etc</a:t>
+                </a:r>
+                <a:r>
+                  <a:rPr lang="en-IN" dirty="0" smtClean="0">
+                    <a:solidFill>
+                      <a:srgbClr val="FF0000"/>
+                    </a:solidFill>
+                  </a:rPr>
+                  <a:t> didn’t agree</a:t>
+                </a:r>
+                <a:endParaRPr lang="en-IN" dirty="0" smtClean="0">
+                  <a:solidFill>
+                    <a:srgbClr val="FF0000"/>
+                  </a:solidFill>
+                </a:endParaRPr>
+              </a:p>
+              <a:p>
+                <a:r>
+                  <a:rPr lang="en-IN" dirty="0" smtClean="0"/>
+                  <a:t>MAPE density plot and 95%HPDI</a:t>
+                </a:r>
+              </a:p>
+              <a:p>
+                <a:r>
+                  <a:rPr lang="en-IN" dirty="0" smtClean="0"/>
+                  <a:t>In 2D: mean </a:t>
+                </a:r>
+                <a:r>
+                  <a:rPr lang="en-IN" dirty="0" err="1" smtClean="0"/>
+                  <a:t>mahalanobis</a:t>
+                </a:r>
+                <a:r>
+                  <a:rPr lang="en-IN" dirty="0" smtClean="0"/>
+                  <a:t> distance to other components can be checked. It becomes skewed on choosing higher number of elements. So the right number of components.</a:t>
+                </a:r>
+                <a:endParaRPr lang="en-IN" dirty="0"/>
+              </a:p>
+            </p:txBody>
+          </p:sp>
+        </mc:Choice>
+        <mc:Fallback>
+          <p:sp>
+            <p:nvSpPr>
+              <p:cNvPr id="3" name="Content Placeholder 2"/>
+              <p:cNvSpPr>
+                <a:spLocks noGrp="1" noRot="1" noChangeAspect="1" noMove="1" noResize="1" noEditPoints="1" noAdjustHandles="1" noChangeArrowheads="1" noChangeShapeType="1" noTextEdit="1"/>
+              </p:cNvSpPr>
+              <p:nvPr>
+                <p:ph idx="1"/>
+              </p:nvPr>
+            </p:nvSpPr>
+            <p:spPr>
+              <a:blipFill rotWithShape="0">
+                <a:blip r:embed="rId3"/>
+                <a:stretch>
+                  <a:fillRect l="-606" t="-2273" r="-788" b="-2727"/>
+                </a:stretch>
+              </a:blipFill>
+            </p:spPr>
+            <p:txBody>
+              <a:bodyPr/>
+              <a:lstStyle/>
+              <a:p>
+                <a:r>
+                  <a:rPr lang="en-IN">
+                    <a:noFill/>
+                  </a:rPr>
+                  <a:t> </a:t>
+                </a:r>
+              </a:p>
+            </p:txBody>
+          </p:sp>
+        </mc:Fallback>
+      </mc:AlternateContent>
       <p:sp>
         <p:nvSpPr>
           <p:cNvPr id="4" name="Slide Number Placeholder 3"/>
@@ -26964,7 +26412,7 @@
     </p:spTree>
     <p:extLst>
       <p:ext uri="{BB962C8B-B14F-4D97-AF65-F5344CB8AC3E}">
-        <p14:creationId xmlns:p14="http://schemas.microsoft.com/office/powerpoint/2010/main" val="4071190941"/>
+        <p14:creationId xmlns:p14="http://schemas.microsoft.com/office/powerpoint/2010/main" val="1393650434"/>
       </p:ext>
     </p:extLst>
   </p:cSld>
@@ -27638,7 +27086,7 @@
           <a:p>
             <a:r>
               <a:rPr lang="en-IN" dirty="0" smtClean="0"/>
-              <a:t>What remains?</a:t>
+              <a:t>Discussion</a:t>
             </a:r>
             <a:endParaRPr lang="en-IN" dirty="0"/>
           </a:p>
@@ -27661,17 +27109,37 @@
           <a:p>
             <a:r>
               <a:rPr lang="en-IN" dirty="0" smtClean="0"/>
-              <a:t>Other Bayesian measures</a:t>
+              <a:t>Talk about negative </a:t>
+            </a:r>
+            <a:r>
+              <a:rPr lang="en-IN" dirty="0" err="1" smtClean="0"/>
+              <a:t>pD</a:t>
+            </a:r>
+            <a:endParaRPr lang="en-IN" dirty="0" smtClean="0"/>
+          </a:p>
+          <a:p>
+            <a:r>
+              <a:rPr lang="en-IN" dirty="0" smtClean="0"/>
+              <a:t>What are the equations and results</a:t>
+            </a:r>
+            <a:r>
+              <a:rPr lang="en-IN" dirty="0" smtClean="0"/>
+              <a:t>.</a:t>
             </a:r>
           </a:p>
           <a:p>
             <a:r>
               <a:rPr lang="en-IN" dirty="0" smtClean="0"/>
-              <a:t>Modelling the data</a:t>
+              <a:t>Talk about priors </a:t>
             </a:r>
-            <a:endParaRPr lang="en-IN" dirty="0" smtClean="0"/>
-          </a:p>
-          <a:p>
+            <a:r>
+              <a:rPr lang="en-IN" dirty="0" err="1" smtClean="0"/>
+              <a:t>etc</a:t>
+            </a:r>
+            <a:r>
+              <a:rPr lang="en-IN" smtClean="0"/>
+              <a:t>….that you used</a:t>
+            </a:r>
             <a:endParaRPr lang="en-IN" dirty="0" smtClean="0"/>
           </a:p>
           <a:p>
@@ -27706,6 +27174,117 @@
     </p:spTree>
     <p:extLst>
       <p:ext uri="{BB962C8B-B14F-4D97-AF65-F5344CB8AC3E}">
+        <p14:creationId xmlns:p14="http://schemas.microsoft.com/office/powerpoint/2010/main" val="4071190941"/>
+      </p:ext>
+    </p:extLst>
+  </p:cSld>
+  <p:clrMapOvr>
+    <a:masterClrMapping/>
+  </p:clrMapOvr>
+</p:sld>
+</file>
+
+<file path=ppt/slides/slide21.xml><?xml version="1.0" encoding="utf-8"?>
+<p:sld xmlns:a="http://schemas.openxmlformats.org/drawingml/2006/main" xmlns:r="http://schemas.openxmlformats.org/officeDocument/2006/relationships" xmlns:p="http://schemas.openxmlformats.org/presentationml/2006/main">
+  <p:cSld>
+    <p:spTree>
+      <p:nvGrpSpPr>
+        <p:cNvPr id="1" name=""/>
+        <p:cNvGrpSpPr/>
+        <p:nvPr/>
+      </p:nvGrpSpPr>
+      <p:grpSpPr>
+        <a:xfrm>
+          <a:off x="0" y="0"/>
+          <a:ext cx="0" cy="0"/>
+          <a:chOff x="0" y="0"/>
+          <a:chExt cx="0" cy="0"/>
+        </a:xfrm>
+      </p:grpSpPr>
+      <p:sp>
+        <p:nvSpPr>
+          <p:cNvPr id="2" name="Title 1"/>
+          <p:cNvSpPr>
+            <a:spLocks noGrp="1"/>
+          </p:cNvSpPr>
+          <p:nvPr>
+            <p:ph type="title"/>
+          </p:nvPr>
+        </p:nvSpPr>
+        <p:spPr/>
+        <p:txBody>
+          <a:bodyPr/>
+          <a:lstStyle/>
+          <a:p>
+            <a:r>
+              <a:rPr lang="en-IN" dirty="0" smtClean="0"/>
+              <a:t>What remains?</a:t>
+            </a:r>
+            <a:endParaRPr lang="en-IN" dirty="0"/>
+          </a:p>
+        </p:txBody>
+      </p:sp>
+      <p:sp>
+        <p:nvSpPr>
+          <p:cNvPr id="3" name="Content Placeholder 2"/>
+          <p:cNvSpPr>
+            <a:spLocks noGrp="1"/>
+          </p:cNvSpPr>
+          <p:nvPr>
+            <p:ph idx="1"/>
+          </p:nvPr>
+        </p:nvSpPr>
+        <p:spPr/>
+        <p:txBody>
+          <a:bodyPr/>
+          <a:lstStyle/>
+          <a:p>
+            <a:r>
+              <a:rPr lang="en-IN" dirty="0" smtClean="0"/>
+              <a:t>Other Bayesian measures</a:t>
+            </a:r>
+          </a:p>
+          <a:p>
+            <a:r>
+              <a:rPr lang="en-IN" dirty="0" smtClean="0"/>
+              <a:t>Modelling the data</a:t>
+            </a:r>
+          </a:p>
+          <a:p>
+            <a:endParaRPr lang="en-IN" dirty="0" smtClean="0"/>
+          </a:p>
+          <a:p>
+            <a:endParaRPr lang="en-IN" dirty="0"/>
+          </a:p>
+        </p:txBody>
+      </p:sp>
+      <p:sp>
+        <p:nvSpPr>
+          <p:cNvPr id="4" name="Slide Number Placeholder 3"/>
+          <p:cNvSpPr>
+            <a:spLocks noGrp="1"/>
+          </p:cNvSpPr>
+          <p:nvPr>
+            <p:ph type="sldNum" sz="quarter" idx="12"/>
+          </p:nvPr>
+        </p:nvSpPr>
+        <p:spPr/>
+        <p:txBody>
+          <a:bodyPr/>
+          <a:lstStyle/>
+          <a:p>
+            <a:fld id="{6113E31D-E2AB-40D1-8B51-AFA5AFEF393A}" type="slidenum">
+              <a:rPr lang="en-US" smtClean="0"/>
+              <a:pPr/>
+              <a:t>21</a:t>
+            </a:fld>
+            <a:endParaRPr lang="en-US" dirty="0"/>
+          </a:p>
+        </p:txBody>
+      </p:sp>
+    </p:spTree>
+    <p:extLst>
+      <p:ext uri="{BB962C8B-B14F-4D97-AF65-F5344CB8AC3E}">
         <p14:creationId xmlns:p14="http://schemas.microsoft.com/office/powerpoint/2010/main" val="368656516"/>
       </p:ext>
     </p:extLst>
@@ -27723,7 +27302,7 @@
 </p:sld>
 </file>
 
-<file path=ppt/slides/slide21.xml><?xml version="1.0" encoding="utf-8"?>
+<file path=ppt/slides/slide22.xml><?xml version="1.0" encoding="utf-8"?>
 <p:sld xmlns:a="http://schemas.openxmlformats.org/drawingml/2006/main" xmlns:r="http://schemas.openxmlformats.org/officeDocument/2006/relationships" xmlns:p="http://schemas.openxmlformats.org/presentationml/2006/main">
   <p:cSld>
     <p:spTree>
@@ -27800,7 +27379,7 @@
             <a:fld id="{6113E31D-E2AB-40D1-8B51-AFA5AFEF393A}" type="slidenum">
               <a:rPr lang="en-US" smtClean="0"/>
               <a:pPr/>
-              <a:t>21</a:t>
+              <a:t>22</a:t>
             </a:fld>
             <a:endParaRPr lang="en-US" dirty="0"/>
           </a:p>
@@ -27819,7 +27398,7 @@
 </p:sld>
 </file>
 
-<file path=ppt/slides/slide22.xml><?xml version="1.0" encoding="utf-8"?>
+<file path=ppt/slides/slide23.xml><?xml version="1.0" encoding="utf-8"?>
 <p:sld xmlns:a="http://schemas.openxmlformats.org/drawingml/2006/main" xmlns:r="http://schemas.openxmlformats.org/officeDocument/2006/relationships" xmlns:p="http://schemas.openxmlformats.org/presentationml/2006/main">
   <p:cSld>
     <p:spTree>
@@ -27902,7 +27481,7 @@
             <a:fld id="{6113E31D-E2AB-40D1-8B51-AFA5AFEF393A}" type="slidenum">
               <a:rPr lang="en-US" smtClean="0"/>
               <a:pPr/>
-              <a:t>22</a:t>
+              <a:t>23</a:t>
             </a:fld>
             <a:endParaRPr lang="en-US" dirty="0"/>
           </a:p>
@@ -27928,7 +27507,7 @@
 </p:sld>
 </file>
 
-<file path=ppt/slides/slide23.xml><?xml version="1.0" encoding="utf-8"?>
+<file path=ppt/slides/slide24.xml><?xml version="1.0" encoding="utf-8"?>
 <p:sld xmlns:a="http://schemas.openxmlformats.org/drawingml/2006/main" xmlns:r="http://schemas.openxmlformats.org/officeDocument/2006/relationships" xmlns:p="http://schemas.openxmlformats.org/presentationml/2006/main">
   <p:cSld>
     <p:spTree>
@@ -27986,7 +27565,7 @@
             <a:fld id="{6113E31D-E2AB-40D1-8B51-AFA5AFEF393A}" type="slidenum">
               <a:rPr lang="en-US" smtClean="0"/>
               <a:pPr/>
-              <a:t>23</a:t>
+              <a:t>24</a:t>
             </a:fld>
             <a:endParaRPr lang="en-US" dirty="0"/>
           </a:p>

</xml_diff>

<commit_message>
bayes factor first cut
</commit_message>
<xml_diff>
--- a/mid term presentation.pptx
+++ b/mid term presentation.pptx
@@ -10415,7 +10415,7 @@
           <a:p>
             <a:fld id="{3D63F0B7-4086-4782-831C-AF1C749D82D7}" type="datetimeFigureOut">
               <a:rPr lang="en-US"/>
-              <a:t>3/7/2016</a:t>
+              <a:t>3/12/2016</a:t>
             </a:fld>
             <a:endParaRPr lang="en-US"/>
           </a:p>
@@ -10990,7 +10990,7 @@
           <a:p>
             <a:fld id="{5DEC605F-B7B5-4674-B28F-F497069155F3}" type="datetime1">
               <a:rPr lang="en-US" smtClean="0"/>
-              <a:t>3/7/2016</a:t>
+              <a:t>3/12/2016</a:t>
             </a:fld>
             <a:endParaRPr lang="en-US" dirty="0"/>
           </a:p>
@@ -11257,7 +11257,7 @@
           <a:p>
             <a:fld id="{4C9717C8-88C9-46F3-9C17-B8958533C4E1}" type="datetime1">
               <a:rPr lang="en-US" smtClean="0"/>
-              <a:t>3/7/2016</a:t>
+              <a:t>3/12/2016</a:t>
             </a:fld>
             <a:endParaRPr lang="en-US" dirty="0"/>
           </a:p>
@@ -11518,7 +11518,7 @@
           <a:p>
             <a:fld id="{DFB31FA2-3C95-4DA0-8F94-C773F1282CF8}" type="datetime1">
               <a:rPr lang="en-US" smtClean="0"/>
-              <a:t>3/7/2016</a:t>
+              <a:t>3/12/2016</a:t>
             </a:fld>
             <a:endParaRPr lang="en-US" dirty="0"/>
           </a:p>
@@ -11751,7 +11751,7 @@
           <a:p>
             <a:fld id="{96C4D736-4FC0-44DB-B5A6-0A892DCF338F}" type="datetime1">
               <a:rPr lang="en-US" smtClean="0"/>
-              <a:t>3/7/2016</a:t>
+              <a:t>3/12/2016</a:t>
             </a:fld>
             <a:endParaRPr lang="en-US" dirty="0"/>
           </a:p>
@@ -12159,7 +12159,7 @@
           <a:p>
             <a:fld id="{8434BA4B-5710-4911-9B3D-361AE1C407A7}" type="datetime1">
               <a:rPr lang="en-US" smtClean="0"/>
-              <a:t>3/7/2016</a:t>
+              <a:t>3/12/2016</a:t>
             </a:fld>
             <a:endParaRPr lang="en-US" dirty="0"/>
           </a:p>
@@ -12492,7 +12492,7 @@
           <a:p>
             <a:fld id="{E58D5AF2-506B-4141-A603-D2627314BA60}" type="datetime1">
               <a:rPr lang="en-US" smtClean="0"/>
-              <a:t>3/7/2016</a:t>
+              <a:t>3/12/2016</a:t>
             </a:fld>
             <a:endParaRPr lang="en-US" dirty="0"/>
           </a:p>
@@ -12875,7 +12875,7 @@
           <a:p>
             <a:fld id="{8C40E3F5-6B12-4EED-A57B-44737E7E5497}" type="datetime1">
               <a:rPr lang="en-US" smtClean="0"/>
-              <a:t>3/7/2016</a:t>
+              <a:t>3/12/2016</a:t>
             </a:fld>
             <a:endParaRPr lang="en-US" dirty="0"/>
           </a:p>
@@ -12992,7 +12992,7 @@
           <a:p>
             <a:fld id="{2E252D13-B46F-4D3C-9B9E-2F84E2367EE6}" type="datetime1">
               <a:rPr lang="en-US" smtClean="0"/>
-              <a:t>3/7/2016</a:t>
+              <a:t>3/12/2016</a:t>
             </a:fld>
             <a:endParaRPr lang="en-US" dirty="0"/>
           </a:p>
@@ -13163,7 +13163,7 @@
           <a:p>
             <a:fld id="{A06F4D39-EBA1-485E-BCB4-E8BD13DB3677}" type="datetime1">
               <a:rPr lang="en-US" smtClean="0"/>
-              <a:t>3/7/2016</a:t>
+              <a:t>3/12/2016</a:t>
             </a:fld>
             <a:endParaRPr lang="en-US" dirty="0"/>
           </a:p>
@@ -13577,7 +13577,7 @@
           <a:p>
             <a:fld id="{49207368-093B-4F7E-A616-1FF43E4A3B8A}" type="datetime1">
               <a:rPr lang="en-US" smtClean="0"/>
-              <a:t>3/7/2016</a:t>
+              <a:t>3/12/2016</a:t>
             </a:fld>
             <a:endParaRPr lang="en-US" dirty="0"/>
           </a:p>
@@ -14014,7 +14014,7 @@
           <a:p>
             <a:fld id="{94847F1A-F40B-4094-98BB-85D8FC957A3E}" type="datetime1">
               <a:rPr lang="en-US" smtClean="0"/>
-              <a:t>3/7/2016</a:t>
+              <a:t>3/12/2016</a:t>
             </a:fld>
             <a:endParaRPr lang="en-US" dirty="0"/>
           </a:p>
@@ -14360,7 +14360,7 @@
           <a:p>
             <a:fld id="{32136411-0D9C-4584-8A4E-0CB0C8665326}" type="datetime1">
               <a:rPr lang="en-US" smtClean="0"/>
-              <a:t>3/7/2016</a:t>
+              <a:t>3/12/2016</a:t>
             </a:fld>
             <a:endParaRPr lang="en-US" dirty="0"/>
           </a:p>
@@ -26176,8 +26176,8 @@
           </p:sp>
         </mc:Fallback>
       </mc:AlternateContent>
-      <mc:AlternateContent xmlns:mc="http://schemas.openxmlformats.org/markup-compatibility/2006">
-        <mc:Choice xmlns:a14="http://schemas.microsoft.com/office/drawing/2010/main" Requires="a14">
+      <mc:AlternateContent xmlns:mc="http://schemas.openxmlformats.org/markup-compatibility/2006" xmlns:a14="http://schemas.microsoft.com/office/drawing/2010/main">
+        <mc:Choice Requires="a14">
           <p:sp>
             <p:nvSpPr>
               <p:cNvPr id="3" name="Content Placeholder 2"/>
@@ -26279,15 +26279,7 @@
                       <a:srgbClr val="FF0000"/>
                     </a:solidFill>
                   </a:rPr>
-                  <a:t>If you have less components than needed then the higher order moments are not in the </a:t>
-                </a:r>
-                <a:r>
-                  <a:rPr lang="en-IN" dirty="0" smtClean="0">
-                    <a:solidFill>
-                      <a:srgbClr val="FF0000"/>
-                    </a:solidFill>
-                  </a:rPr>
-                  <a:t>95%HPDI…..</a:t>
+                  <a:t>If you have less components than needed then the higher order moments are not in the 95%HPDI…..</a:t>
                 </a:r>
                 <a:r>
                   <a:rPr lang="en-IN" dirty="0" err="1" smtClean="0">
@@ -26321,11 +26313,6 @@
                   </a:rPr>
                   <a:t> didn’t agree</a:t>
                 </a:r>
-                <a:endParaRPr lang="en-IN" dirty="0" smtClean="0">
-                  <a:solidFill>
-                    <a:srgbClr val="FF0000"/>
-                  </a:solidFill>
-                </a:endParaRPr>
               </a:p>
               <a:p>
                 <a:r>
@@ -26351,7 +26338,7 @@
             </p:txBody>
           </p:sp>
         </mc:Choice>
-        <mc:Fallback>
+        <mc:Fallback xmlns="">
           <p:sp>
             <p:nvSpPr>
               <p:cNvPr id="3" name="Content Placeholder 2"/>
@@ -27120,11 +27107,7 @@
           <a:p>
             <a:r>
               <a:rPr lang="en-IN" dirty="0" smtClean="0"/>
-              <a:t>What are the equations and results</a:t>
-            </a:r>
-            <a:r>
-              <a:rPr lang="en-IN" dirty="0" smtClean="0"/>
-              <a:t>.</a:t>
+              <a:t>What are the equations and results.</a:t>
             </a:r>
           </a:p>
           <a:p>
@@ -27137,8 +27120,28 @@
               <a:t>etc</a:t>
             </a:r>
             <a:r>
+              <a:rPr lang="en-IN" dirty="0" smtClean="0"/>
+              <a:t>….that you </a:t>
+            </a:r>
+            <a:r>
+              <a:rPr lang="en-IN" dirty="0" smtClean="0"/>
+              <a:t>used</a:t>
+            </a:r>
+          </a:p>
+          <a:p>
+            <a:r>
+              <a:rPr lang="en-IN" dirty="0" smtClean="0"/>
+              <a:t>JAGS Burn in issue</a:t>
+            </a:r>
+          </a:p>
+          <a:p>
+            <a:r>
+              <a:rPr lang="en-IN" dirty="0" smtClean="0"/>
+              <a:t>JAGS </a:t>
+            </a:r>
+            <a:r>
               <a:rPr lang="en-IN" smtClean="0"/>
-              <a:t>….that you used</a:t>
+              <a:t>constraints issue</a:t>
             </a:r>
             <a:endParaRPr lang="en-IN" dirty="0" smtClean="0"/>
           </a:p>

</xml_diff>